<commit_message>
Added more instructions for lab1
</commit_message>
<xml_diff>
--- a/cs61a/discussion/lab1.pptx
+++ b/cs61a/discussion/lab1.pptx
@@ -1,20 +1,23 @@
 
 <file path=ppt/presentation.xml><?xml version="1.0" encoding="utf-8"?>
-<p:presentation xmlns:a="http://schemas.openxmlformats.org/drawingml/2006/main" xmlns:r="http://schemas.openxmlformats.org/officeDocument/2006/relationships" xmlns:p="http://schemas.openxmlformats.org/presentationml/2006/main" saveSubsetFonts="1">
+<p:presentation xmlns:a="http://schemas.openxmlformats.org/drawingml/2006/main" xmlns:r="http://schemas.openxmlformats.org/officeDocument/2006/relationships" xmlns:p="http://schemas.openxmlformats.org/presentationml/2006/main" compatMode="1" saveSubsetFonts="1">
   <p:sldMasterIdLst>
     <p:sldMasterId id="2147483792" r:id="rId1"/>
   </p:sldMasterIdLst>
   <p:notesMasterIdLst>
-    <p:notesMasterId r:id="rId6"/>
+    <p:notesMasterId r:id="rId9"/>
   </p:notesMasterIdLst>
   <p:handoutMasterIdLst>
-    <p:handoutMasterId r:id="rId7"/>
+    <p:handoutMasterId r:id="rId10"/>
   </p:handoutMasterIdLst>
   <p:sldIdLst>
     <p:sldId id="256" r:id="rId2"/>
     <p:sldId id="257" r:id="rId3"/>
     <p:sldId id="258" r:id="rId4"/>
     <p:sldId id="259" r:id="rId5"/>
+    <p:sldId id="260" r:id="rId6"/>
+    <p:sldId id="261" r:id="rId7"/>
+    <p:sldId id="262" r:id="rId8"/>
   </p:sldIdLst>
   <p:sldSz cx="9144000" cy="6858000" type="screen4x3"/>
   <p:notesSz cx="6858000" cy="9144000"/>
@@ -1659,6 +1662,870 @@
                 </a:spcAft>
               </a:pPr>
               <a:t>4</a:t>
+            </a:fld>
+            <a:endParaRPr lang="en-US">
+              <a:latin typeface="Calibri" charset="0"/>
+            </a:endParaRPr>
+          </a:p>
+        </p:txBody>
+      </p:sp>
+    </p:spTree>
+  </p:cSld>
+  <p:clrMapOvr>
+    <a:masterClrMapping/>
+  </p:clrMapOvr>
+</p:notes>
+</file>
+
+<file path=ppt/notesSlides/notesSlide4.xml><?xml version="1.0" encoding="utf-8"?>
+<p:notes xmlns:a="http://schemas.openxmlformats.org/drawingml/2006/main" xmlns:r="http://schemas.openxmlformats.org/officeDocument/2006/relationships" xmlns:p="http://schemas.openxmlformats.org/presentationml/2006/main">
+  <p:cSld>
+    <p:spTree>
+      <p:nvGrpSpPr>
+        <p:cNvPr id="1" name=""/>
+        <p:cNvGrpSpPr/>
+        <p:nvPr/>
+      </p:nvGrpSpPr>
+      <p:grpSpPr>
+        <a:xfrm>
+          <a:off x="0" y="0"/>
+          <a:ext cx="0" cy="0"/>
+          <a:chOff x="0" y="0"/>
+          <a:chExt cx="0" cy="0"/>
+        </a:xfrm>
+      </p:grpSpPr>
+      <p:sp>
+        <p:nvSpPr>
+          <p:cNvPr id="21505" name="Slide Image Placeholder 1"/>
+          <p:cNvSpPr>
+            <a:spLocks noGrp="1" noRot="1" noChangeAspect="1"/>
+          </p:cNvSpPr>
+          <p:nvPr>
+            <p:ph type="sldImg"/>
+          </p:nvPr>
+        </p:nvSpPr>
+        <p:spPr bwMode="auto">
+          <a:noFill/>
+          <a:ln>
+            <a:solidFill>
+              <a:srgbClr val="000000"/>
+            </a:solidFill>
+            <a:miter lim="800000"/>
+            <a:headEnd/>
+            <a:tailEnd/>
+          </a:ln>
+          <a:extLst>
+            <a:ext uri="{909E8E84-426E-40dd-AFC4-6F175D3DCCD1}">
+              <a14:hiddenFill xmlns:a14="http://schemas.microsoft.com/office/drawing/2010/main">
+                <a:solidFill>
+                  <a:srgbClr val="FFFFFF"/>
+                </a:solidFill>
+              </a14:hiddenFill>
+            </a:ext>
+            <a:ext uri="{FAA26D3D-D897-4be2-8F04-BA451C77F1D7}">
+              <ma14:placeholderFlag xmlns:ma14="http://schemas.microsoft.com/office/mac/drawingml/2011/main" val="1"/>
+            </a:ext>
+          </a:extLst>
+        </p:spPr>
+      </p:sp>
+      <p:sp>
+        <p:nvSpPr>
+          <p:cNvPr id="21506" name="Notes Placeholder 2"/>
+          <p:cNvSpPr>
+            <a:spLocks noGrp="1"/>
+          </p:cNvSpPr>
+          <p:nvPr>
+            <p:ph type="body" idx="1"/>
+          </p:nvPr>
+        </p:nvSpPr>
+        <p:spPr bwMode="auto">
+          <a:noFill/>
+          <a:extLst>
+            <a:ext uri="{909E8E84-426E-40dd-AFC4-6F175D3DCCD1}">
+              <a14:hiddenFill xmlns:a14="http://schemas.microsoft.com/office/drawing/2010/main">
+                <a:solidFill>
+                  <a:srgbClr val="FFFFFF"/>
+                </a:solidFill>
+              </a14:hiddenFill>
+            </a:ext>
+            <a:ext uri="{91240B29-F687-4f45-9708-019B960494DF}">
+              <a14:hiddenLine xmlns:a14="http://schemas.microsoft.com/office/drawing/2010/main" w="9525">
+                <a:solidFill>
+                  <a:srgbClr val="000000"/>
+                </a:solidFill>
+                <a:miter lim="800000"/>
+                <a:headEnd/>
+                <a:tailEnd/>
+              </a14:hiddenLine>
+            </a:ext>
+            <a:ext uri="{FAA26D3D-D897-4be2-8F04-BA451C77F1D7}">
+              <ma14:placeholderFlag xmlns:ma14="http://schemas.microsoft.com/office/mac/drawingml/2011/main" val="1"/>
+            </a:ext>
+          </a:extLst>
+        </p:spPr>
+        <p:txBody>
+          <a:bodyPr wrap="square" numCol="1" anchor="t" anchorCtr="0" compatLnSpc="1">
+            <a:prstTxWarp prst="textNoShape">
+              <a:avLst/>
+            </a:prstTxWarp>
+          </a:bodyPr>
+          <a:lstStyle/>
+          <a:p>
+            <a:pPr>
+              <a:spcBef>
+                <a:spcPct val="0"/>
+              </a:spcBef>
+            </a:pPr>
+            <a:endParaRPr lang="en-US">
+              <a:latin typeface="Calibri" charset="0"/>
+            </a:endParaRPr>
+          </a:p>
+        </p:txBody>
+      </p:sp>
+      <p:sp>
+        <p:nvSpPr>
+          <p:cNvPr id="21507" name="Slide Number Placeholder 3"/>
+          <p:cNvSpPr>
+            <a:spLocks noGrp="1"/>
+          </p:cNvSpPr>
+          <p:nvPr>
+            <p:ph type="sldNum" sz="quarter" idx="5"/>
+          </p:nvPr>
+        </p:nvSpPr>
+        <p:spPr bwMode="auto">
+          <a:noFill/>
+          <a:extLst>
+            <a:ext uri="{909E8E84-426E-40dd-AFC4-6F175D3DCCD1}">
+              <a14:hiddenFill xmlns:a14="http://schemas.microsoft.com/office/drawing/2010/main">
+                <a:solidFill>
+                  <a:srgbClr val="FFFFFF"/>
+                </a:solidFill>
+              </a14:hiddenFill>
+            </a:ext>
+            <a:ext uri="{91240B29-F687-4f45-9708-019B960494DF}">
+              <a14:hiddenLine xmlns:a14="http://schemas.microsoft.com/office/drawing/2010/main" w="9525">
+                <a:solidFill>
+                  <a:srgbClr val="000000"/>
+                </a:solidFill>
+                <a:miter lim="800000"/>
+                <a:headEnd/>
+                <a:tailEnd/>
+              </a14:hiddenLine>
+            </a:ext>
+          </a:extLst>
+        </p:spPr>
+        <p:txBody>
+          <a:bodyPr wrap="square" numCol="1" anchorCtr="0" compatLnSpc="1">
+            <a:prstTxWarp prst="textNoShape">
+              <a:avLst/>
+            </a:prstTxWarp>
+          </a:bodyPr>
+          <a:lstStyle>
+            <a:lvl1pPr>
+              <a:defRPr>
+                <a:solidFill>
+                  <a:schemeClr val="tx1"/>
+                </a:solidFill>
+                <a:latin typeface="Century Gothic" charset="0"/>
+                <a:ea typeface="ＭＳ Ｐゴシック" charset="0"/>
+                <a:cs typeface="ＭＳ Ｐゴシック" charset="0"/>
+              </a:defRPr>
+            </a:lvl1pPr>
+            <a:lvl2pPr marL="742950" indent="-285750">
+              <a:defRPr>
+                <a:solidFill>
+                  <a:schemeClr val="tx1"/>
+                </a:solidFill>
+                <a:latin typeface="Century Gothic" charset="0"/>
+                <a:ea typeface="ＭＳ Ｐゴシック" charset="0"/>
+              </a:defRPr>
+            </a:lvl2pPr>
+            <a:lvl3pPr marL="1143000" indent="-228600">
+              <a:defRPr>
+                <a:solidFill>
+                  <a:schemeClr val="tx1"/>
+                </a:solidFill>
+                <a:latin typeface="Century Gothic" charset="0"/>
+                <a:ea typeface="ＭＳ Ｐゴシック" charset="0"/>
+              </a:defRPr>
+            </a:lvl3pPr>
+            <a:lvl4pPr marL="1600200" indent="-228600">
+              <a:defRPr>
+                <a:solidFill>
+                  <a:schemeClr val="tx1"/>
+                </a:solidFill>
+                <a:latin typeface="Century Gothic" charset="0"/>
+                <a:ea typeface="ＭＳ Ｐゴシック" charset="0"/>
+              </a:defRPr>
+            </a:lvl4pPr>
+            <a:lvl5pPr marL="2057400" indent="-228600">
+              <a:defRPr>
+                <a:solidFill>
+                  <a:schemeClr val="tx1"/>
+                </a:solidFill>
+                <a:latin typeface="Century Gothic" charset="0"/>
+                <a:ea typeface="ＭＳ Ｐゴシック" charset="0"/>
+              </a:defRPr>
+            </a:lvl5pPr>
+            <a:lvl6pPr marL="2514600" indent="-228600" fontAlgn="base">
+              <a:spcBef>
+                <a:spcPct val="0"/>
+              </a:spcBef>
+              <a:spcAft>
+                <a:spcPct val="0"/>
+              </a:spcAft>
+              <a:defRPr>
+                <a:solidFill>
+                  <a:schemeClr val="tx1"/>
+                </a:solidFill>
+                <a:latin typeface="Century Gothic" charset="0"/>
+                <a:ea typeface="ＭＳ Ｐゴシック" charset="0"/>
+              </a:defRPr>
+            </a:lvl6pPr>
+            <a:lvl7pPr marL="2971800" indent="-228600" fontAlgn="base">
+              <a:spcBef>
+                <a:spcPct val="0"/>
+              </a:spcBef>
+              <a:spcAft>
+                <a:spcPct val="0"/>
+              </a:spcAft>
+              <a:defRPr>
+                <a:solidFill>
+                  <a:schemeClr val="tx1"/>
+                </a:solidFill>
+                <a:latin typeface="Century Gothic" charset="0"/>
+                <a:ea typeface="ＭＳ Ｐゴシック" charset="0"/>
+              </a:defRPr>
+            </a:lvl7pPr>
+            <a:lvl8pPr marL="3429000" indent="-228600" fontAlgn="base">
+              <a:spcBef>
+                <a:spcPct val="0"/>
+              </a:spcBef>
+              <a:spcAft>
+                <a:spcPct val="0"/>
+              </a:spcAft>
+              <a:defRPr>
+                <a:solidFill>
+                  <a:schemeClr val="tx1"/>
+                </a:solidFill>
+                <a:latin typeface="Century Gothic" charset="0"/>
+                <a:ea typeface="ＭＳ Ｐゴシック" charset="0"/>
+              </a:defRPr>
+            </a:lvl8pPr>
+            <a:lvl9pPr marL="3886200" indent="-228600" fontAlgn="base">
+              <a:spcBef>
+                <a:spcPct val="0"/>
+              </a:spcBef>
+              <a:spcAft>
+                <a:spcPct val="0"/>
+              </a:spcAft>
+              <a:defRPr>
+                <a:solidFill>
+                  <a:schemeClr val="tx1"/>
+                </a:solidFill>
+                <a:latin typeface="Century Gothic" charset="0"/>
+                <a:ea typeface="ＭＳ Ｐゴシック" charset="0"/>
+              </a:defRPr>
+            </a:lvl9pPr>
+          </a:lstStyle>
+          <a:p>
+            <a:pPr fontAlgn="base">
+              <a:spcBef>
+                <a:spcPct val="0"/>
+              </a:spcBef>
+              <a:spcAft>
+                <a:spcPct val="0"/>
+              </a:spcAft>
+            </a:pPr>
+            <a:fld id="{D925DA98-8938-FA4F-B19D-C0BD4794D78C}" type="slidenum">
+              <a:rPr lang="en-US">
+                <a:latin typeface="Calibri" charset="0"/>
+              </a:rPr>
+              <a:pPr fontAlgn="base">
+                <a:spcBef>
+                  <a:spcPct val="0"/>
+                </a:spcBef>
+                <a:spcAft>
+                  <a:spcPct val="0"/>
+                </a:spcAft>
+              </a:pPr>
+              <a:t>5</a:t>
+            </a:fld>
+            <a:endParaRPr lang="en-US">
+              <a:latin typeface="Calibri" charset="0"/>
+            </a:endParaRPr>
+          </a:p>
+        </p:txBody>
+      </p:sp>
+    </p:spTree>
+  </p:cSld>
+  <p:clrMapOvr>
+    <a:masterClrMapping/>
+  </p:clrMapOvr>
+</p:notes>
+</file>
+
+<file path=ppt/notesSlides/notesSlide5.xml><?xml version="1.0" encoding="utf-8"?>
+<p:notes xmlns:a="http://schemas.openxmlformats.org/drawingml/2006/main" xmlns:r="http://schemas.openxmlformats.org/officeDocument/2006/relationships" xmlns:p="http://schemas.openxmlformats.org/presentationml/2006/main">
+  <p:cSld>
+    <p:spTree>
+      <p:nvGrpSpPr>
+        <p:cNvPr id="1" name=""/>
+        <p:cNvGrpSpPr/>
+        <p:nvPr/>
+      </p:nvGrpSpPr>
+      <p:grpSpPr>
+        <a:xfrm>
+          <a:off x="0" y="0"/>
+          <a:ext cx="0" cy="0"/>
+          <a:chOff x="0" y="0"/>
+          <a:chExt cx="0" cy="0"/>
+        </a:xfrm>
+      </p:grpSpPr>
+      <p:sp>
+        <p:nvSpPr>
+          <p:cNvPr id="21505" name="Slide Image Placeholder 1"/>
+          <p:cNvSpPr>
+            <a:spLocks noGrp="1" noRot="1" noChangeAspect="1"/>
+          </p:cNvSpPr>
+          <p:nvPr>
+            <p:ph type="sldImg"/>
+          </p:nvPr>
+        </p:nvSpPr>
+        <p:spPr bwMode="auto">
+          <a:noFill/>
+          <a:ln>
+            <a:solidFill>
+              <a:srgbClr val="000000"/>
+            </a:solidFill>
+            <a:miter lim="800000"/>
+            <a:headEnd/>
+            <a:tailEnd/>
+          </a:ln>
+          <a:extLst>
+            <a:ext uri="{909E8E84-426E-40dd-AFC4-6F175D3DCCD1}">
+              <a14:hiddenFill xmlns:a14="http://schemas.microsoft.com/office/drawing/2010/main">
+                <a:solidFill>
+                  <a:srgbClr val="FFFFFF"/>
+                </a:solidFill>
+              </a14:hiddenFill>
+            </a:ext>
+            <a:ext uri="{FAA26D3D-D897-4be2-8F04-BA451C77F1D7}">
+              <ma14:placeholderFlag xmlns:ma14="http://schemas.microsoft.com/office/mac/drawingml/2011/main" val="1"/>
+            </a:ext>
+          </a:extLst>
+        </p:spPr>
+      </p:sp>
+      <p:sp>
+        <p:nvSpPr>
+          <p:cNvPr id="21506" name="Notes Placeholder 2"/>
+          <p:cNvSpPr>
+            <a:spLocks noGrp="1"/>
+          </p:cNvSpPr>
+          <p:nvPr>
+            <p:ph type="body" idx="1"/>
+          </p:nvPr>
+        </p:nvSpPr>
+        <p:spPr bwMode="auto">
+          <a:noFill/>
+          <a:extLst>
+            <a:ext uri="{909E8E84-426E-40dd-AFC4-6F175D3DCCD1}">
+              <a14:hiddenFill xmlns:a14="http://schemas.microsoft.com/office/drawing/2010/main">
+                <a:solidFill>
+                  <a:srgbClr val="FFFFFF"/>
+                </a:solidFill>
+              </a14:hiddenFill>
+            </a:ext>
+            <a:ext uri="{91240B29-F687-4f45-9708-019B960494DF}">
+              <a14:hiddenLine xmlns:a14="http://schemas.microsoft.com/office/drawing/2010/main" w="9525">
+                <a:solidFill>
+                  <a:srgbClr val="000000"/>
+                </a:solidFill>
+                <a:miter lim="800000"/>
+                <a:headEnd/>
+                <a:tailEnd/>
+              </a14:hiddenLine>
+            </a:ext>
+            <a:ext uri="{FAA26D3D-D897-4be2-8F04-BA451C77F1D7}">
+              <ma14:placeholderFlag xmlns:ma14="http://schemas.microsoft.com/office/mac/drawingml/2011/main" val="1"/>
+            </a:ext>
+          </a:extLst>
+        </p:spPr>
+        <p:txBody>
+          <a:bodyPr wrap="square" numCol="1" anchor="t" anchorCtr="0" compatLnSpc="1">
+            <a:prstTxWarp prst="textNoShape">
+              <a:avLst/>
+            </a:prstTxWarp>
+          </a:bodyPr>
+          <a:lstStyle/>
+          <a:p>
+            <a:pPr>
+              <a:spcBef>
+                <a:spcPct val="0"/>
+              </a:spcBef>
+            </a:pPr>
+            <a:endParaRPr lang="en-US">
+              <a:latin typeface="Calibri" charset="0"/>
+            </a:endParaRPr>
+          </a:p>
+        </p:txBody>
+      </p:sp>
+      <p:sp>
+        <p:nvSpPr>
+          <p:cNvPr id="21507" name="Slide Number Placeholder 3"/>
+          <p:cNvSpPr>
+            <a:spLocks noGrp="1"/>
+          </p:cNvSpPr>
+          <p:nvPr>
+            <p:ph type="sldNum" sz="quarter" idx="5"/>
+          </p:nvPr>
+        </p:nvSpPr>
+        <p:spPr bwMode="auto">
+          <a:noFill/>
+          <a:extLst>
+            <a:ext uri="{909E8E84-426E-40dd-AFC4-6F175D3DCCD1}">
+              <a14:hiddenFill xmlns:a14="http://schemas.microsoft.com/office/drawing/2010/main">
+                <a:solidFill>
+                  <a:srgbClr val="FFFFFF"/>
+                </a:solidFill>
+              </a14:hiddenFill>
+            </a:ext>
+            <a:ext uri="{91240B29-F687-4f45-9708-019B960494DF}">
+              <a14:hiddenLine xmlns:a14="http://schemas.microsoft.com/office/drawing/2010/main" w="9525">
+                <a:solidFill>
+                  <a:srgbClr val="000000"/>
+                </a:solidFill>
+                <a:miter lim="800000"/>
+                <a:headEnd/>
+                <a:tailEnd/>
+              </a14:hiddenLine>
+            </a:ext>
+          </a:extLst>
+        </p:spPr>
+        <p:txBody>
+          <a:bodyPr wrap="square" numCol="1" anchorCtr="0" compatLnSpc="1">
+            <a:prstTxWarp prst="textNoShape">
+              <a:avLst/>
+            </a:prstTxWarp>
+          </a:bodyPr>
+          <a:lstStyle>
+            <a:lvl1pPr>
+              <a:defRPr>
+                <a:solidFill>
+                  <a:schemeClr val="tx1"/>
+                </a:solidFill>
+                <a:latin typeface="Century Gothic" charset="0"/>
+                <a:ea typeface="ＭＳ Ｐゴシック" charset="0"/>
+                <a:cs typeface="ＭＳ Ｐゴシック" charset="0"/>
+              </a:defRPr>
+            </a:lvl1pPr>
+            <a:lvl2pPr marL="742950" indent="-285750">
+              <a:defRPr>
+                <a:solidFill>
+                  <a:schemeClr val="tx1"/>
+                </a:solidFill>
+                <a:latin typeface="Century Gothic" charset="0"/>
+                <a:ea typeface="ＭＳ Ｐゴシック" charset="0"/>
+              </a:defRPr>
+            </a:lvl2pPr>
+            <a:lvl3pPr marL="1143000" indent="-228600">
+              <a:defRPr>
+                <a:solidFill>
+                  <a:schemeClr val="tx1"/>
+                </a:solidFill>
+                <a:latin typeface="Century Gothic" charset="0"/>
+                <a:ea typeface="ＭＳ Ｐゴシック" charset="0"/>
+              </a:defRPr>
+            </a:lvl3pPr>
+            <a:lvl4pPr marL="1600200" indent="-228600">
+              <a:defRPr>
+                <a:solidFill>
+                  <a:schemeClr val="tx1"/>
+                </a:solidFill>
+                <a:latin typeface="Century Gothic" charset="0"/>
+                <a:ea typeface="ＭＳ Ｐゴシック" charset="0"/>
+              </a:defRPr>
+            </a:lvl4pPr>
+            <a:lvl5pPr marL="2057400" indent="-228600">
+              <a:defRPr>
+                <a:solidFill>
+                  <a:schemeClr val="tx1"/>
+                </a:solidFill>
+                <a:latin typeface="Century Gothic" charset="0"/>
+                <a:ea typeface="ＭＳ Ｐゴシック" charset="0"/>
+              </a:defRPr>
+            </a:lvl5pPr>
+            <a:lvl6pPr marL="2514600" indent="-228600" fontAlgn="base">
+              <a:spcBef>
+                <a:spcPct val="0"/>
+              </a:spcBef>
+              <a:spcAft>
+                <a:spcPct val="0"/>
+              </a:spcAft>
+              <a:defRPr>
+                <a:solidFill>
+                  <a:schemeClr val="tx1"/>
+                </a:solidFill>
+                <a:latin typeface="Century Gothic" charset="0"/>
+                <a:ea typeface="ＭＳ Ｐゴシック" charset="0"/>
+              </a:defRPr>
+            </a:lvl6pPr>
+            <a:lvl7pPr marL="2971800" indent="-228600" fontAlgn="base">
+              <a:spcBef>
+                <a:spcPct val="0"/>
+              </a:spcBef>
+              <a:spcAft>
+                <a:spcPct val="0"/>
+              </a:spcAft>
+              <a:defRPr>
+                <a:solidFill>
+                  <a:schemeClr val="tx1"/>
+                </a:solidFill>
+                <a:latin typeface="Century Gothic" charset="0"/>
+                <a:ea typeface="ＭＳ Ｐゴシック" charset="0"/>
+              </a:defRPr>
+            </a:lvl7pPr>
+            <a:lvl8pPr marL="3429000" indent="-228600" fontAlgn="base">
+              <a:spcBef>
+                <a:spcPct val="0"/>
+              </a:spcBef>
+              <a:spcAft>
+                <a:spcPct val="0"/>
+              </a:spcAft>
+              <a:defRPr>
+                <a:solidFill>
+                  <a:schemeClr val="tx1"/>
+                </a:solidFill>
+                <a:latin typeface="Century Gothic" charset="0"/>
+                <a:ea typeface="ＭＳ Ｐゴシック" charset="0"/>
+              </a:defRPr>
+            </a:lvl8pPr>
+            <a:lvl9pPr marL="3886200" indent="-228600" fontAlgn="base">
+              <a:spcBef>
+                <a:spcPct val="0"/>
+              </a:spcBef>
+              <a:spcAft>
+                <a:spcPct val="0"/>
+              </a:spcAft>
+              <a:defRPr>
+                <a:solidFill>
+                  <a:schemeClr val="tx1"/>
+                </a:solidFill>
+                <a:latin typeface="Century Gothic" charset="0"/>
+                <a:ea typeface="ＭＳ Ｐゴシック" charset="0"/>
+              </a:defRPr>
+            </a:lvl9pPr>
+          </a:lstStyle>
+          <a:p>
+            <a:pPr fontAlgn="base">
+              <a:spcBef>
+                <a:spcPct val="0"/>
+              </a:spcBef>
+              <a:spcAft>
+                <a:spcPct val="0"/>
+              </a:spcAft>
+            </a:pPr>
+            <a:fld id="{D925DA98-8938-FA4F-B19D-C0BD4794D78C}" type="slidenum">
+              <a:rPr lang="en-US">
+                <a:latin typeface="Calibri" charset="0"/>
+              </a:rPr>
+              <a:pPr fontAlgn="base">
+                <a:spcBef>
+                  <a:spcPct val="0"/>
+                </a:spcBef>
+                <a:spcAft>
+                  <a:spcPct val="0"/>
+                </a:spcAft>
+              </a:pPr>
+              <a:t>6</a:t>
+            </a:fld>
+            <a:endParaRPr lang="en-US">
+              <a:latin typeface="Calibri" charset="0"/>
+            </a:endParaRPr>
+          </a:p>
+        </p:txBody>
+      </p:sp>
+    </p:spTree>
+  </p:cSld>
+  <p:clrMapOvr>
+    <a:masterClrMapping/>
+  </p:clrMapOvr>
+</p:notes>
+</file>
+
+<file path=ppt/notesSlides/notesSlide6.xml><?xml version="1.0" encoding="utf-8"?>
+<p:notes xmlns:a="http://schemas.openxmlformats.org/drawingml/2006/main" xmlns:r="http://schemas.openxmlformats.org/officeDocument/2006/relationships" xmlns:p="http://schemas.openxmlformats.org/presentationml/2006/main">
+  <p:cSld>
+    <p:spTree>
+      <p:nvGrpSpPr>
+        <p:cNvPr id="1" name=""/>
+        <p:cNvGrpSpPr/>
+        <p:nvPr/>
+      </p:nvGrpSpPr>
+      <p:grpSpPr>
+        <a:xfrm>
+          <a:off x="0" y="0"/>
+          <a:ext cx="0" cy="0"/>
+          <a:chOff x="0" y="0"/>
+          <a:chExt cx="0" cy="0"/>
+        </a:xfrm>
+      </p:grpSpPr>
+      <p:sp>
+        <p:nvSpPr>
+          <p:cNvPr id="21505" name="Slide Image Placeholder 1"/>
+          <p:cNvSpPr>
+            <a:spLocks noGrp="1" noRot="1" noChangeAspect="1"/>
+          </p:cNvSpPr>
+          <p:nvPr>
+            <p:ph type="sldImg"/>
+          </p:nvPr>
+        </p:nvSpPr>
+        <p:spPr bwMode="auto">
+          <a:noFill/>
+          <a:ln>
+            <a:solidFill>
+              <a:srgbClr val="000000"/>
+            </a:solidFill>
+            <a:miter lim="800000"/>
+            <a:headEnd/>
+            <a:tailEnd/>
+          </a:ln>
+          <a:extLst>
+            <a:ext uri="{909E8E84-426E-40dd-AFC4-6F175D3DCCD1}">
+              <a14:hiddenFill xmlns:a14="http://schemas.microsoft.com/office/drawing/2010/main">
+                <a:solidFill>
+                  <a:srgbClr val="FFFFFF"/>
+                </a:solidFill>
+              </a14:hiddenFill>
+            </a:ext>
+            <a:ext uri="{FAA26D3D-D897-4be2-8F04-BA451C77F1D7}">
+              <ma14:placeholderFlag xmlns:ma14="http://schemas.microsoft.com/office/mac/drawingml/2011/main" val="1"/>
+            </a:ext>
+          </a:extLst>
+        </p:spPr>
+      </p:sp>
+      <p:sp>
+        <p:nvSpPr>
+          <p:cNvPr id="21506" name="Notes Placeholder 2"/>
+          <p:cNvSpPr>
+            <a:spLocks noGrp="1"/>
+          </p:cNvSpPr>
+          <p:nvPr>
+            <p:ph type="body" idx="1"/>
+          </p:nvPr>
+        </p:nvSpPr>
+        <p:spPr bwMode="auto">
+          <a:noFill/>
+          <a:extLst>
+            <a:ext uri="{909E8E84-426E-40dd-AFC4-6F175D3DCCD1}">
+              <a14:hiddenFill xmlns:a14="http://schemas.microsoft.com/office/drawing/2010/main">
+                <a:solidFill>
+                  <a:srgbClr val="FFFFFF"/>
+                </a:solidFill>
+              </a14:hiddenFill>
+            </a:ext>
+            <a:ext uri="{91240B29-F687-4f45-9708-019B960494DF}">
+              <a14:hiddenLine xmlns:a14="http://schemas.microsoft.com/office/drawing/2010/main" w="9525">
+                <a:solidFill>
+                  <a:srgbClr val="000000"/>
+                </a:solidFill>
+                <a:miter lim="800000"/>
+                <a:headEnd/>
+                <a:tailEnd/>
+              </a14:hiddenLine>
+            </a:ext>
+            <a:ext uri="{FAA26D3D-D897-4be2-8F04-BA451C77F1D7}">
+              <ma14:placeholderFlag xmlns:ma14="http://schemas.microsoft.com/office/mac/drawingml/2011/main" val="1"/>
+            </a:ext>
+          </a:extLst>
+        </p:spPr>
+        <p:txBody>
+          <a:bodyPr wrap="square" numCol="1" anchor="t" anchorCtr="0" compatLnSpc="1">
+            <a:prstTxWarp prst="textNoShape">
+              <a:avLst/>
+            </a:prstTxWarp>
+          </a:bodyPr>
+          <a:lstStyle/>
+          <a:p>
+            <a:pPr>
+              <a:spcBef>
+                <a:spcPct val="0"/>
+              </a:spcBef>
+            </a:pPr>
+            <a:endParaRPr lang="en-US">
+              <a:latin typeface="Calibri" charset="0"/>
+            </a:endParaRPr>
+          </a:p>
+        </p:txBody>
+      </p:sp>
+      <p:sp>
+        <p:nvSpPr>
+          <p:cNvPr id="21507" name="Slide Number Placeholder 3"/>
+          <p:cNvSpPr>
+            <a:spLocks noGrp="1"/>
+          </p:cNvSpPr>
+          <p:nvPr>
+            <p:ph type="sldNum" sz="quarter" idx="5"/>
+          </p:nvPr>
+        </p:nvSpPr>
+        <p:spPr bwMode="auto">
+          <a:noFill/>
+          <a:extLst>
+            <a:ext uri="{909E8E84-426E-40dd-AFC4-6F175D3DCCD1}">
+              <a14:hiddenFill xmlns:a14="http://schemas.microsoft.com/office/drawing/2010/main">
+                <a:solidFill>
+                  <a:srgbClr val="FFFFFF"/>
+                </a:solidFill>
+              </a14:hiddenFill>
+            </a:ext>
+            <a:ext uri="{91240B29-F687-4f45-9708-019B960494DF}">
+              <a14:hiddenLine xmlns:a14="http://schemas.microsoft.com/office/drawing/2010/main" w="9525">
+                <a:solidFill>
+                  <a:srgbClr val="000000"/>
+                </a:solidFill>
+                <a:miter lim="800000"/>
+                <a:headEnd/>
+                <a:tailEnd/>
+              </a14:hiddenLine>
+            </a:ext>
+          </a:extLst>
+        </p:spPr>
+        <p:txBody>
+          <a:bodyPr wrap="square" numCol="1" anchorCtr="0" compatLnSpc="1">
+            <a:prstTxWarp prst="textNoShape">
+              <a:avLst/>
+            </a:prstTxWarp>
+          </a:bodyPr>
+          <a:lstStyle>
+            <a:lvl1pPr>
+              <a:defRPr>
+                <a:solidFill>
+                  <a:schemeClr val="tx1"/>
+                </a:solidFill>
+                <a:latin typeface="Century Gothic" charset="0"/>
+                <a:ea typeface="ＭＳ Ｐゴシック" charset="0"/>
+                <a:cs typeface="ＭＳ Ｐゴシック" charset="0"/>
+              </a:defRPr>
+            </a:lvl1pPr>
+            <a:lvl2pPr marL="742950" indent="-285750">
+              <a:defRPr>
+                <a:solidFill>
+                  <a:schemeClr val="tx1"/>
+                </a:solidFill>
+                <a:latin typeface="Century Gothic" charset="0"/>
+                <a:ea typeface="ＭＳ Ｐゴシック" charset="0"/>
+              </a:defRPr>
+            </a:lvl2pPr>
+            <a:lvl3pPr marL="1143000" indent="-228600">
+              <a:defRPr>
+                <a:solidFill>
+                  <a:schemeClr val="tx1"/>
+                </a:solidFill>
+                <a:latin typeface="Century Gothic" charset="0"/>
+                <a:ea typeface="ＭＳ Ｐゴシック" charset="0"/>
+              </a:defRPr>
+            </a:lvl3pPr>
+            <a:lvl4pPr marL="1600200" indent="-228600">
+              <a:defRPr>
+                <a:solidFill>
+                  <a:schemeClr val="tx1"/>
+                </a:solidFill>
+                <a:latin typeface="Century Gothic" charset="0"/>
+                <a:ea typeface="ＭＳ Ｐゴシック" charset="0"/>
+              </a:defRPr>
+            </a:lvl4pPr>
+            <a:lvl5pPr marL="2057400" indent="-228600">
+              <a:defRPr>
+                <a:solidFill>
+                  <a:schemeClr val="tx1"/>
+                </a:solidFill>
+                <a:latin typeface="Century Gothic" charset="0"/>
+                <a:ea typeface="ＭＳ Ｐゴシック" charset="0"/>
+              </a:defRPr>
+            </a:lvl5pPr>
+            <a:lvl6pPr marL="2514600" indent="-228600" fontAlgn="base">
+              <a:spcBef>
+                <a:spcPct val="0"/>
+              </a:spcBef>
+              <a:spcAft>
+                <a:spcPct val="0"/>
+              </a:spcAft>
+              <a:defRPr>
+                <a:solidFill>
+                  <a:schemeClr val="tx1"/>
+                </a:solidFill>
+                <a:latin typeface="Century Gothic" charset="0"/>
+                <a:ea typeface="ＭＳ Ｐゴシック" charset="0"/>
+              </a:defRPr>
+            </a:lvl6pPr>
+            <a:lvl7pPr marL="2971800" indent="-228600" fontAlgn="base">
+              <a:spcBef>
+                <a:spcPct val="0"/>
+              </a:spcBef>
+              <a:spcAft>
+                <a:spcPct val="0"/>
+              </a:spcAft>
+              <a:defRPr>
+                <a:solidFill>
+                  <a:schemeClr val="tx1"/>
+                </a:solidFill>
+                <a:latin typeface="Century Gothic" charset="0"/>
+                <a:ea typeface="ＭＳ Ｐゴシック" charset="0"/>
+              </a:defRPr>
+            </a:lvl7pPr>
+            <a:lvl8pPr marL="3429000" indent="-228600" fontAlgn="base">
+              <a:spcBef>
+                <a:spcPct val="0"/>
+              </a:spcBef>
+              <a:spcAft>
+                <a:spcPct val="0"/>
+              </a:spcAft>
+              <a:defRPr>
+                <a:solidFill>
+                  <a:schemeClr val="tx1"/>
+                </a:solidFill>
+                <a:latin typeface="Century Gothic" charset="0"/>
+                <a:ea typeface="ＭＳ Ｐゴシック" charset="0"/>
+              </a:defRPr>
+            </a:lvl8pPr>
+            <a:lvl9pPr marL="3886200" indent="-228600" fontAlgn="base">
+              <a:spcBef>
+                <a:spcPct val="0"/>
+              </a:spcBef>
+              <a:spcAft>
+                <a:spcPct val="0"/>
+              </a:spcAft>
+              <a:defRPr>
+                <a:solidFill>
+                  <a:schemeClr val="tx1"/>
+                </a:solidFill>
+                <a:latin typeface="Century Gothic" charset="0"/>
+                <a:ea typeface="ＭＳ Ｐゴシック" charset="0"/>
+              </a:defRPr>
+            </a:lvl9pPr>
+          </a:lstStyle>
+          <a:p>
+            <a:pPr fontAlgn="base">
+              <a:spcBef>
+                <a:spcPct val="0"/>
+              </a:spcBef>
+              <a:spcAft>
+                <a:spcPct val="0"/>
+              </a:spcAft>
+            </a:pPr>
+            <a:fld id="{D925DA98-8938-FA4F-B19D-C0BD4794D78C}" type="slidenum">
+              <a:rPr lang="en-US">
+                <a:latin typeface="Calibri" charset="0"/>
+              </a:rPr>
+              <a:pPr fontAlgn="base">
+                <a:spcBef>
+                  <a:spcPct val="0"/>
+                </a:spcBef>
+                <a:spcAft>
+                  <a:spcPct val="0"/>
+                </a:spcAft>
+              </a:pPr>
+              <a:t>7</a:t>
             </a:fld>
             <a:endParaRPr lang="en-US">
               <a:latin typeface="Calibri" charset="0"/>
@@ -17931,15 +18798,6 @@
           <a:bodyPr/>
           <a:lstStyle/>
           <a:p>
-            <a:endParaRPr lang="en-US" dirty="0">
-              <a:solidFill>
-                <a:srgbClr val="4A6300"/>
-              </a:solidFill>
-              <a:latin typeface="Avenir Book" charset="0"/>
-              <a:cs typeface="Avenir Book" charset="0"/>
-            </a:endParaRPr>
-          </a:p>
-          <a:p>
             <a:r>
               <a:rPr lang="en-US" dirty="0" smtClean="0">
                 <a:solidFill>
@@ -18280,7 +19138,7 @@
                                         <p:tgtEl>
                                           <p:spTgt spid="3">
                                             <p:txEl>
-                                              <p:pRg st="1" end="1"/>
+                                              <p:pRg st="0" end="0"/>
                                             </p:txEl>
                                           </p:spTgt>
                                         </p:tgtEl>
@@ -18298,7 +19156,7 @@
                                         <p:tgtEl>
                                           <p:spTgt spid="3">
                                             <p:txEl>
-                                              <p:pRg st="1" end="1"/>
+                                              <p:pRg st="0" end="0"/>
                                             </p:txEl>
                                           </p:spTgt>
                                         </p:tgtEl>
@@ -18325,7 +19183,7 @@
                                         <p:tgtEl>
                                           <p:spTgt spid="3">
                                             <p:txEl>
-                                              <p:pRg st="1" end="1"/>
+                                              <p:pRg st="0" end="0"/>
                                             </p:txEl>
                                           </p:spTgt>
                                         </p:tgtEl>
@@ -18365,7 +19223,7 @@
                                         <p:tgtEl>
                                           <p:spTgt spid="3">
                                             <p:txEl>
-                                              <p:pRg st="2" end="2"/>
+                                              <p:pRg st="1" end="1"/>
                                             </p:txEl>
                                           </p:spTgt>
                                         </p:tgtEl>
@@ -18383,7 +19241,7 @@
                                         <p:tgtEl>
                                           <p:spTgt spid="3">
                                             <p:txEl>
-                                              <p:pRg st="2" end="2"/>
+                                              <p:pRg st="1" end="1"/>
                                             </p:txEl>
                                           </p:spTgt>
                                         </p:tgtEl>
@@ -18410,7 +19268,7 @@
                                         <p:tgtEl>
                                           <p:spTgt spid="3">
                                             <p:txEl>
-                                              <p:pRg st="2" end="2"/>
+                                              <p:pRg st="1" end="1"/>
                                             </p:txEl>
                                           </p:spTgt>
                                         </p:tgtEl>
@@ -18450,7 +19308,7 @@
                                         <p:tgtEl>
                                           <p:spTgt spid="3">
                                             <p:txEl>
-                                              <p:pRg st="3" end="3"/>
+                                              <p:pRg st="2" end="2"/>
                                             </p:txEl>
                                           </p:spTgt>
                                         </p:tgtEl>
@@ -18468,7 +19326,7 @@
                                         <p:tgtEl>
                                           <p:spTgt spid="3">
                                             <p:txEl>
-                                              <p:pRg st="3" end="3"/>
+                                              <p:pRg st="2" end="2"/>
                                             </p:txEl>
                                           </p:spTgt>
                                         </p:tgtEl>
@@ -18495,7 +19353,7 @@
                                         <p:tgtEl>
                                           <p:spTgt spid="3">
                                             <p:txEl>
-                                              <p:pRg st="3" end="3"/>
+                                              <p:pRg st="2" end="2"/>
                                             </p:txEl>
                                           </p:spTgt>
                                         </p:tgtEl>
@@ -18535,7 +19393,7 @@
                                         <p:tgtEl>
                                           <p:spTgt spid="3">
                                             <p:txEl>
-                                              <p:pRg st="4" end="4"/>
+                                              <p:pRg st="3" end="3"/>
                                             </p:txEl>
                                           </p:spTgt>
                                         </p:tgtEl>
@@ -18553,7 +19411,7 @@
                                         <p:tgtEl>
                                           <p:spTgt spid="3">
                                             <p:txEl>
-                                              <p:pRg st="4" end="4"/>
+                                              <p:pRg st="3" end="3"/>
                                             </p:txEl>
                                           </p:spTgt>
                                         </p:tgtEl>
@@ -18580,7 +19438,7 @@
                                         <p:tgtEl>
                                           <p:spTgt spid="3">
                                             <p:txEl>
-                                              <p:pRg st="4" end="4"/>
+                                              <p:pRg st="3" end="3"/>
                                             </p:txEl>
                                           </p:spTgt>
                                         </p:tgtEl>
@@ -18638,7 +19496,7 @@
                                         <p:tgtEl>
                                           <p:spTgt spid="3">
                                             <p:txEl>
-                                              <p:pRg st="5" end="5"/>
+                                              <p:pRg st="4" end="4"/>
                                             </p:txEl>
                                           </p:spTgt>
                                         </p:tgtEl>
@@ -18656,7 +19514,7 @@
                                         <p:tgtEl>
                                           <p:spTgt spid="3">
                                             <p:txEl>
-                                              <p:pRg st="5" end="5"/>
+                                              <p:pRg st="4" end="4"/>
                                             </p:txEl>
                                           </p:spTgt>
                                         </p:tgtEl>
@@ -18683,7 +19541,7 @@
                                         <p:tgtEl>
                                           <p:spTgt spid="3">
                                             <p:txEl>
-                                              <p:pRg st="5" end="5"/>
+                                              <p:pRg st="4" end="4"/>
                                             </p:txEl>
                                           </p:spTgt>
                                         </p:tgtEl>
@@ -18723,7 +19581,7 @@
                                         <p:tgtEl>
                                           <p:spTgt spid="3">
                                             <p:txEl>
-                                              <p:pRg st="6" end="6"/>
+                                              <p:pRg st="5" end="5"/>
                                             </p:txEl>
                                           </p:spTgt>
                                         </p:tgtEl>
@@ -18741,7 +19599,7 @@
                                         <p:tgtEl>
                                           <p:spTgt spid="3">
                                             <p:txEl>
-                                              <p:pRg st="6" end="6"/>
+                                              <p:pRg st="5" end="5"/>
                                             </p:txEl>
                                           </p:spTgt>
                                         </p:tgtEl>
@@ -18768,7 +19626,7 @@
                                         <p:tgtEl>
                                           <p:spTgt spid="3">
                                             <p:txEl>
-                                              <p:pRg st="6" end="6"/>
+                                              <p:pRg st="5" end="5"/>
                                             </p:txEl>
                                           </p:spTgt>
                                         </p:tgtEl>
@@ -18808,7 +19666,7 @@
                                         <p:tgtEl>
                                           <p:spTgt spid="3">
                                             <p:txEl>
-                                              <p:pRg st="7" end="7"/>
+                                              <p:pRg st="6" end="6"/>
                                             </p:txEl>
                                           </p:spTgt>
                                         </p:tgtEl>
@@ -18826,7 +19684,7 @@
                                         <p:tgtEl>
                                           <p:spTgt spid="3">
                                             <p:txEl>
-                                              <p:pRg st="7" end="7"/>
+                                              <p:pRg st="6" end="6"/>
                                             </p:txEl>
                                           </p:spTgt>
                                         </p:tgtEl>
@@ -18853,7 +19711,7 @@
                                         <p:tgtEl>
                                           <p:spTgt spid="3">
                                             <p:txEl>
-                                              <p:pRg st="7" end="7"/>
+                                              <p:pRg st="6" end="6"/>
                                             </p:txEl>
                                           </p:spTgt>
                                         </p:tgtEl>
@@ -18893,7 +19751,7 @@
                                         <p:tgtEl>
                                           <p:spTgt spid="3">
                                             <p:txEl>
-                                              <p:pRg st="8" end="8"/>
+                                              <p:pRg st="7" end="7"/>
                                             </p:txEl>
                                           </p:spTgt>
                                         </p:tgtEl>
@@ -18911,7 +19769,7 @@
                                         <p:tgtEl>
                                           <p:spTgt spid="3">
                                             <p:txEl>
-                                              <p:pRg st="8" end="8"/>
+                                              <p:pRg st="7" end="7"/>
                                             </p:txEl>
                                           </p:spTgt>
                                         </p:tgtEl>
@@ -18938,7 +19796,7 @@
                                         <p:tgtEl>
                                           <p:spTgt spid="3">
                                             <p:txEl>
-                                              <p:pRg st="8" end="8"/>
+                                              <p:pRg st="7" end="7"/>
                                             </p:txEl>
                                           </p:spTgt>
                                         </p:tgtEl>
@@ -21009,6 +21867,3330 @@
                                           <p:spTgt spid="3">
                                             <p:txEl>
                                               <p:pRg st="6" end="6"/>
+                                            </p:txEl>
+                                          </p:spTgt>
+                                        </p:tgtEl>
+                                        <p:attrNameLst>
+                                          <p:attrName>ppt_y</p:attrName>
+                                        </p:attrNameLst>
+                                      </p:cBhvr>
+                                      <p:tavLst>
+                                        <p:tav tm="0">
+                                          <p:val>
+                                            <p:strVal val="1+#ppt_h/2"/>
+                                          </p:val>
+                                        </p:tav>
+                                        <p:tav tm="100000">
+                                          <p:val>
+                                            <p:strVal val="#ppt_y"/>
+                                          </p:val>
+                                        </p:tav>
+                                      </p:tavLst>
+                                    </p:anim>
+                                  </p:childTnLst>
+                                </p:cTn>
+                              </p:par>
+                            </p:childTnLst>
+                          </p:cTn>
+                        </p:par>
+                      </p:childTnLst>
+                    </p:cTn>
+                  </p:par>
+                </p:childTnLst>
+              </p:cTn>
+              <p:prevCondLst>
+                <p:cond evt="onPrev" delay="0">
+                  <p:tgtEl>
+                    <p:sldTgt/>
+                  </p:tgtEl>
+                </p:cond>
+              </p:prevCondLst>
+              <p:nextCondLst>
+                <p:cond evt="onNext" delay="0">
+                  <p:tgtEl>
+                    <p:sldTgt/>
+                  </p:tgtEl>
+                </p:cond>
+              </p:nextCondLst>
+            </p:seq>
+          </p:childTnLst>
+        </p:cTn>
+      </p:par>
+    </p:tnLst>
+    <p:bldLst>
+      <p:bldP spid="3" grpId="0" build="p"/>
+    </p:bldLst>
+  </p:timing>
+</p:sld>
+</file>
+
+<file path=ppt/slides/slide5.xml><?xml version="1.0" encoding="utf-8"?>
+<p:sld xmlns:a="http://schemas.openxmlformats.org/drawingml/2006/main" xmlns:r="http://schemas.openxmlformats.org/officeDocument/2006/relationships" xmlns:p="http://schemas.openxmlformats.org/presentationml/2006/main">
+  <p:cSld>
+    <p:spTree>
+      <p:nvGrpSpPr>
+        <p:cNvPr id="1" name=""/>
+        <p:cNvGrpSpPr/>
+        <p:nvPr/>
+      </p:nvGrpSpPr>
+      <p:grpSpPr>
+        <a:xfrm>
+          <a:off x="0" y="0"/>
+          <a:ext cx="0" cy="0"/>
+          <a:chOff x="0" y="0"/>
+          <a:chExt cx="0" cy="0"/>
+        </a:xfrm>
+      </p:grpSpPr>
+      <p:sp>
+        <p:nvSpPr>
+          <p:cNvPr id="6145" name="Title 1"/>
+          <p:cNvSpPr>
+            <a:spLocks noGrp="1"/>
+          </p:cNvSpPr>
+          <p:nvPr>
+            <p:ph type="title"/>
+          </p:nvPr>
+        </p:nvSpPr>
+        <p:spPr>
+          <a:xfrm>
+            <a:off x="1042988" y="455613"/>
+            <a:ext cx="7024687" cy="1143000"/>
+          </a:xfrm>
+        </p:spPr>
+        <p:txBody>
+          <a:bodyPr/>
+          <a:lstStyle/>
+          <a:p>
+            <a:r>
+              <a:rPr lang="en-US" dirty="0" smtClean="0">
+                <a:latin typeface="Century Gothic" charset="0"/>
+              </a:rPr>
+              <a:t>Directions</a:t>
+            </a:r>
+            <a:endParaRPr lang="en-US" dirty="0">
+              <a:latin typeface="Century Gothic" charset="0"/>
+            </a:endParaRPr>
+          </a:p>
+        </p:txBody>
+      </p:sp>
+      <p:sp>
+        <p:nvSpPr>
+          <p:cNvPr id="3" name="Content Placeholder 2"/>
+          <p:cNvSpPr>
+            <a:spLocks noGrp="1"/>
+          </p:cNvSpPr>
+          <p:nvPr>
+            <p:ph idx="1"/>
+          </p:nvPr>
+        </p:nvSpPr>
+        <p:spPr>
+          <a:xfrm>
+            <a:off x="457199" y="1598613"/>
+            <a:ext cx="8314267" cy="4903787"/>
+          </a:xfrm>
+        </p:spPr>
+        <p:txBody>
+          <a:bodyPr/>
+          <a:lstStyle/>
+          <a:p>
+            <a:pPr marL="527050" indent="-457200">
+              <a:buFont typeface="+mj-lt"/>
+              <a:buAutoNum type="arabicPeriod"/>
+            </a:pPr>
+            <a:r>
+              <a:rPr lang="en-US" dirty="0" smtClean="0">
+                <a:solidFill>
+                  <a:srgbClr val="4A6300"/>
+                </a:solidFill>
+                <a:latin typeface="Avenir Book" charset="0"/>
+                <a:cs typeface="Avenir Book" charset="0"/>
+              </a:rPr>
+              <a:t>Get an account form from me</a:t>
+            </a:r>
+          </a:p>
+          <a:p>
+            <a:pPr marL="527050" indent="-457200">
+              <a:buFont typeface="+mj-lt"/>
+              <a:buAutoNum type="arabicPeriod"/>
+            </a:pPr>
+            <a:r>
+              <a:rPr lang="en-US" dirty="0" smtClean="0">
+                <a:solidFill>
+                  <a:srgbClr val="4A6300"/>
+                </a:solidFill>
+                <a:latin typeface="Avenir Book" charset="0"/>
+                <a:cs typeface="Avenir Book" charset="0"/>
+              </a:rPr>
+              <a:t>Log into the school computer with your account</a:t>
+            </a:r>
+          </a:p>
+          <a:p>
+            <a:pPr marL="527050" indent="-457200">
+              <a:buFont typeface="+mj-lt"/>
+              <a:buAutoNum type="arabicPeriod"/>
+            </a:pPr>
+            <a:r>
+              <a:rPr lang="en-US" dirty="0" smtClean="0">
+                <a:solidFill>
+                  <a:srgbClr val="4A6300"/>
+                </a:solidFill>
+                <a:latin typeface="Avenir Book" charset="0"/>
+                <a:cs typeface="Avenir Book" charset="0"/>
+              </a:rPr>
+              <a:t>Open the terminal. There is a funny looking round thing on the top left. Click that, then search/open terminal</a:t>
+            </a:r>
+          </a:p>
+          <a:p>
+            <a:pPr marL="527050" indent="-457200">
+              <a:buFont typeface="+mj-lt"/>
+              <a:buAutoNum type="arabicPeriod"/>
+            </a:pPr>
+            <a:r>
+              <a:rPr lang="en-US" dirty="0" smtClean="0">
+                <a:solidFill>
+                  <a:srgbClr val="4A6300"/>
+                </a:solidFill>
+                <a:latin typeface="Avenir Book" charset="0"/>
+                <a:cs typeface="Avenir Book" charset="0"/>
+              </a:rPr>
+              <a:t>Run </a:t>
+            </a:r>
+            <a:r>
+              <a:rPr lang="en-US" dirty="0" err="1" smtClean="0">
+                <a:solidFill>
+                  <a:srgbClr val="4A6300"/>
+                </a:solidFill>
+                <a:latin typeface="Consolas"/>
+                <a:cs typeface="Consolas"/>
+              </a:rPr>
+              <a:t>ssh</a:t>
+            </a:r>
+            <a:r>
+              <a:rPr lang="en-US" dirty="0" smtClean="0">
+                <a:solidFill>
+                  <a:srgbClr val="4A6300"/>
+                </a:solidFill>
+                <a:latin typeface="Consolas"/>
+                <a:cs typeface="Consolas"/>
+              </a:rPr>
+              <a:t> </a:t>
+            </a:r>
+            <a:r>
+              <a:rPr lang="en-US" dirty="0" err="1" smtClean="0">
+                <a:solidFill>
+                  <a:srgbClr val="4A6300"/>
+                </a:solidFill>
+                <a:latin typeface="Consolas"/>
+                <a:cs typeface="Consolas"/>
+              </a:rPr>
+              <a:t>update.cs.berkeley.edu</a:t>
+            </a:r>
+            <a:r>
+              <a:rPr lang="en-US" dirty="0" smtClean="0">
+                <a:solidFill>
+                  <a:srgbClr val="4A6300"/>
+                </a:solidFill>
+                <a:latin typeface="Consolas"/>
+                <a:cs typeface="Consolas"/>
+              </a:rPr>
+              <a:t> </a:t>
+            </a:r>
+            <a:r>
+              <a:rPr lang="en-US" dirty="0" smtClean="0">
+                <a:solidFill>
+                  <a:srgbClr val="4A6300"/>
+                </a:solidFill>
+                <a:latin typeface="Avenir Book"/>
+                <a:cs typeface="Avenir Book"/>
+              </a:rPr>
+              <a:t>to change your password</a:t>
+            </a:r>
+          </a:p>
+          <a:p>
+            <a:pPr marL="527050" indent="-457200">
+              <a:buFont typeface="+mj-lt"/>
+              <a:buAutoNum type="arabicPeriod"/>
+            </a:pPr>
+            <a:r>
+              <a:rPr lang="en-US" dirty="0">
+                <a:solidFill>
+                  <a:srgbClr val="4A6300"/>
+                </a:solidFill>
+                <a:latin typeface="Avenir Book"/>
+                <a:cs typeface="Avenir Book"/>
+              </a:rPr>
+              <a:t>A</a:t>
+            </a:r>
+            <a:r>
+              <a:rPr lang="en-US" dirty="0" smtClean="0">
+                <a:solidFill>
+                  <a:srgbClr val="4A6300"/>
+                </a:solidFill>
+                <a:latin typeface="Avenir Book"/>
+                <a:cs typeface="Avenir Book"/>
+              </a:rPr>
+              <a:t>ccess the labs for today at </a:t>
+            </a:r>
+            <a:r>
+              <a:rPr lang="en-US" dirty="0" smtClean="0">
+                <a:solidFill>
+                  <a:srgbClr val="4A6300"/>
+                </a:solidFill>
+                <a:latin typeface="Consolas"/>
+                <a:cs typeface="Consolas"/>
+              </a:rPr>
+              <a:t>cs61a.org</a:t>
+            </a:r>
+            <a:endParaRPr lang="en-US" dirty="0" smtClean="0">
+              <a:solidFill>
+                <a:srgbClr val="4A6300"/>
+              </a:solidFill>
+              <a:latin typeface="Avenir Book"/>
+              <a:cs typeface="Avenir Book"/>
+            </a:endParaRPr>
+          </a:p>
+          <a:p>
+            <a:pPr marL="527050" indent="-457200">
+              <a:buFont typeface="+mj-lt"/>
+              <a:buAutoNum type="arabicPeriod"/>
+            </a:pPr>
+            <a:r>
+              <a:rPr lang="en-US" dirty="0" smtClean="0">
+                <a:solidFill>
+                  <a:srgbClr val="4A6300"/>
+                </a:solidFill>
+                <a:latin typeface="Avenir Book"/>
+                <a:cs typeface="Avenir Book"/>
+              </a:rPr>
+              <a:t>Work on lab 0 on the school computers</a:t>
+            </a:r>
+          </a:p>
+          <a:p>
+            <a:pPr marL="527050" indent="-457200">
+              <a:buFont typeface="+mj-lt"/>
+              <a:buAutoNum type="arabicPeriod"/>
+            </a:pPr>
+            <a:r>
+              <a:rPr lang="en-US" dirty="0" smtClean="0">
+                <a:solidFill>
+                  <a:srgbClr val="4A6300"/>
+                </a:solidFill>
+                <a:latin typeface="Avenir Book" charset="0"/>
+                <a:cs typeface="Avenir Book" charset="0"/>
+              </a:rPr>
+              <a:t>Now, you can use your personal machines for lab 1</a:t>
+            </a:r>
+          </a:p>
+          <a:p>
+            <a:pPr marL="823913" lvl="1" indent="-457200">
+              <a:buFont typeface="+mj-lt"/>
+              <a:buAutoNum type="arabicPeriod"/>
+            </a:pPr>
+            <a:r>
+              <a:rPr lang="en-US" sz="1800" dirty="0" smtClean="0">
+                <a:solidFill>
+                  <a:srgbClr val="4A6300"/>
+                </a:solidFill>
+                <a:latin typeface="Avenir Book" charset="0"/>
+                <a:cs typeface="Avenir Book" charset="0"/>
+              </a:rPr>
+              <a:t>Connect remotely: </a:t>
+            </a:r>
+            <a:r>
+              <a:rPr lang="en-US" sz="1800" dirty="0" err="1" smtClean="0">
+                <a:solidFill>
+                  <a:srgbClr val="4A6300"/>
+                </a:solidFill>
+                <a:latin typeface="Consolas"/>
+                <a:cs typeface="Consolas"/>
+              </a:rPr>
+              <a:t>ssh</a:t>
+            </a:r>
+            <a:r>
+              <a:rPr lang="en-US" sz="1800" dirty="0" smtClean="0">
+                <a:solidFill>
+                  <a:srgbClr val="4A6300"/>
+                </a:solidFill>
+                <a:latin typeface="Consolas"/>
+                <a:cs typeface="Consolas"/>
+              </a:rPr>
+              <a:t> cs61a-???@cory.eecs.berkeley.edu</a:t>
+            </a:r>
+          </a:p>
+          <a:p>
+            <a:pPr marL="527050" indent="-457200">
+              <a:buFont typeface="+mj-lt"/>
+              <a:buAutoNum type="arabicPeriod"/>
+            </a:pPr>
+            <a:r>
+              <a:rPr lang="en-US" dirty="0" smtClean="0">
+                <a:solidFill>
+                  <a:srgbClr val="4A6300"/>
+                </a:solidFill>
+                <a:latin typeface="Avenir Book"/>
+                <a:cs typeface="Avenir Book"/>
+              </a:rPr>
+              <a:t>Remember to submit lab01.py from your class account</a:t>
+            </a:r>
+          </a:p>
+          <a:p>
+            <a:pPr marL="69850" indent="0">
+              <a:buNone/>
+            </a:pPr>
+            <a:endParaRPr lang="en-US" dirty="0" smtClean="0">
+              <a:solidFill>
+                <a:srgbClr val="4A6300"/>
+              </a:solidFill>
+              <a:latin typeface="Avenir Book"/>
+              <a:cs typeface="Avenir Book"/>
+            </a:endParaRPr>
+          </a:p>
+        </p:txBody>
+      </p:sp>
+      <p:sp>
+        <p:nvSpPr>
+          <p:cNvPr id="6147" name="Slide Number Placeholder 4"/>
+          <p:cNvSpPr>
+            <a:spLocks noGrp="1"/>
+          </p:cNvSpPr>
+          <p:nvPr>
+            <p:ph type="sldNum" sz="quarter" idx="12"/>
+          </p:nvPr>
+        </p:nvSpPr>
+        <p:spPr bwMode="auto">
+          <a:noFill/>
+          <a:extLst>
+            <a:ext uri="{909E8E84-426E-40dd-AFC4-6F175D3DCCD1}">
+              <a14:hiddenFill xmlns:a14="http://schemas.microsoft.com/office/drawing/2010/main">
+                <a:solidFill>
+                  <a:srgbClr val="FFFFFF"/>
+                </a:solidFill>
+              </a14:hiddenFill>
+            </a:ext>
+            <a:ext uri="{91240B29-F687-4f45-9708-019B960494DF}">
+              <a14:hiddenLine xmlns:a14="http://schemas.microsoft.com/office/drawing/2010/main" w="9525">
+                <a:solidFill>
+                  <a:srgbClr val="000000"/>
+                </a:solidFill>
+                <a:miter lim="800000"/>
+                <a:headEnd/>
+                <a:tailEnd/>
+              </a14:hiddenLine>
+            </a:ext>
+          </a:extLst>
+        </p:spPr>
+        <p:txBody>
+          <a:bodyPr wrap="square" numCol="1" anchorCtr="0" compatLnSpc="1">
+            <a:prstTxWarp prst="textNoShape">
+              <a:avLst/>
+            </a:prstTxWarp>
+          </a:bodyPr>
+          <a:lstStyle>
+            <a:lvl1pPr>
+              <a:defRPr>
+                <a:solidFill>
+                  <a:schemeClr val="tx1"/>
+                </a:solidFill>
+                <a:latin typeface="Century Gothic" charset="0"/>
+                <a:ea typeface="ＭＳ Ｐゴシック" charset="0"/>
+                <a:cs typeface="ＭＳ Ｐゴシック" charset="0"/>
+              </a:defRPr>
+            </a:lvl1pPr>
+            <a:lvl2pPr marL="742950" indent="-285750">
+              <a:defRPr>
+                <a:solidFill>
+                  <a:schemeClr val="tx1"/>
+                </a:solidFill>
+                <a:latin typeface="Century Gothic" charset="0"/>
+                <a:ea typeface="ＭＳ Ｐゴシック" charset="0"/>
+              </a:defRPr>
+            </a:lvl2pPr>
+            <a:lvl3pPr marL="1143000" indent="-228600">
+              <a:defRPr>
+                <a:solidFill>
+                  <a:schemeClr val="tx1"/>
+                </a:solidFill>
+                <a:latin typeface="Century Gothic" charset="0"/>
+                <a:ea typeface="ＭＳ Ｐゴシック" charset="0"/>
+              </a:defRPr>
+            </a:lvl3pPr>
+            <a:lvl4pPr marL="1600200" indent="-228600">
+              <a:defRPr>
+                <a:solidFill>
+                  <a:schemeClr val="tx1"/>
+                </a:solidFill>
+                <a:latin typeface="Century Gothic" charset="0"/>
+                <a:ea typeface="ＭＳ Ｐゴシック" charset="0"/>
+              </a:defRPr>
+            </a:lvl4pPr>
+            <a:lvl5pPr marL="2057400" indent="-228600">
+              <a:defRPr>
+                <a:solidFill>
+                  <a:schemeClr val="tx1"/>
+                </a:solidFill>
+                <a:latin typeface="Century Gothic" charset="0"/>
+                <a:ea typeface="ＭＳ Ｐゴシック" charset="0"/>
+              </a:defRPr>
+            </a:lvl5pPr>
+            <a:lvl6pPr marL="2514600" indent="-228600" fontAlgn="base">
+              <a:spcBef>
+                <a:spcPct val="0"/>
+              </a:spcBef>
+              <a:spcAft>
+                <a:spcPct val="0"/>
+              </a:spcAft>
+              <a:defRPr>
+                <a:solidFill>
+                  <a:schemeClr val="tx1"/>
+                </a:solidFill>
+                <a:latin typeface="Century Gothic" charset="0"/>
+                <a:ea typeface="ＭＳ Ｐゴシック" charset="0"/>
+              </a:defRPr>
+            </a:lvl6pPr>
+            <a:lvl7pPr marL="2971800" indent="-228600" fontAlgn="base">
+              <a:spcBef>
+                <a:spcPct val="0"/>
+              </a:spcBef>
+              <a:spcAft>
+                <a:spcPct val="0"/>
+              </a:spcAft>
+              <a:defRPr>
+                <a:solidFill>
+                  <a:schemeClr val="tx1"/>
+                </a:solidFill>
+                <a:latin typeface="Century Gothic" charset="0"/>
+                <a:ea typeface="ＭＳ Ｐゴシック" charset="0"/>
+              </a:defRPr>
+            </a:lvl7pPr>
+            <a:lvl8pPr marL="3429000" indent="-228600" fontAlgn="base">
+              <a:spcBef>
+                <a:spcPct val="0"/>
+              </a:spcBef>
+              <a:spcAft>
+                <a:spcPct val="0"/>
+              </a:spcAft>
+              <a:defRPr>
+                <a:solidFill>
+                  <a:schemeClr val="tx1"/>
+                </a:solidFill>
+                <a:latin typeface="Century Gothic" charset="0"/>
+                <a:ea typeface="ＭＳ Ｐゴシック" charset="0"/>
+              </a:defRPr>
+            </a:lvl8pPr>
+            <a:lvl9pPr marL="3886200" indent="-228600" fontAlgn="base">
+              <a:spcBef>
+                <a:spcPct val="0"/>
+              </a:spcBef>
+              <a:spcAft>
+                <a:spcPct val="0"/>
+              </a:spcAft>
+              <a:defRPr>
+                <a:solidFill>
+                  <a:schemeClr val="tx1"/>
+                </a:solidFill>
+                <a:latin typeface="Century Gothic" charset="0"/>
+                <a:ea typeface="ＭＳ Ｐゴシック" charset="0"/>
+              </a:defRPr>
+            </a:lvl9pPr>
+          </a:lstStyle>
+          <a:p>
+            <a:pPr fontAlgn="base">
+              <a:spcBef>
+                <a:spcPct val="0"/>
+              </a:spcBef>
+              <a:spcAft>
+                <a:spcPct val="0"/>
+              </a:spcAft>
+            </a:pPr>
+            <a:fld id="{9B6F7E0B-2963-1842-872C-CA99E62BCD77}" type="slidenum">
+              <a:rPr lang="en-US">
+                <a:solidFill>
+                  <a:srgbClr val="FEFEFE"/>
+                </a:solidFill>
+              </a:rPr>
+              <a:pPr fontAlgn="base">
+                <a:spcBef>
+                  <a:spcPct val="0"/>
+                </a:spcBef>
+                <a:spcAft>
+                  <a:spcPct val="0"/>
+                </a:spcAft>
+              </a:pPr>
+              <a:t>5</a:t>
+            </a:fld>
+            <a:endParaRPr lang="en-US">
+              <a:solidFill>
+                <a:srgbClr val="FEFEFE"/>
+              </a:solidFill>
+            </a:endParaRPr>
+          </a:p>
+        </p:txBody>
+      </p:sp>
+    </p:spTree>
+    <p:extLst>
+      <p:ext uri="{BB962C8B-B14F-4D97-AF65-F5344CB8AC3E}">
+        <p14:creationId xmlns:p14="http://schemas.microsoft.com/office/powerpoint/2010/main" val="1693547394"/>
+      </p:ext>
+    </p:extLst>
+  </p:cSld>
+  <p:clrMapOvr>
+    <a:masterClrMapping/>
+  </p:clrMapOvr>
+  <p:timing>
+    <p:tnLst>
+      <p:par>
+        <p:cTn xmlns:p14="http://schemas.microsoft.com/office/powerpoint/2010/main" id="1" dur="indefinite" restart="never" nodeType="tmRoot">
+          <p:childTnLst>
+            <p:seq concurrent="1" nextAc="seek">
+              <p:cTn id="2" dur="indefinite" nodeType="mainSeq">
+                <p:childTnLst>
+                  <p:par>
+                    <p:cTn id="3" fill="hold" nodeType="clickPar">
+                      <p:stCondLst>
+                        <p:cond delay="indefinite"/>
+                      </p:stCondLst>
+                      <p:childTnLst>
+                        <p:par>
+                          <p:cTn id="4" fill="hold" nodeType="withGroup">
+                            <p:stCondLst>
+                              <p:cond delay="0"/>
+                            </p:stCondLst>
+                            <p:childTnLst>
+                              <p:par>
+                                <p:cTn id="5" presetID="2" presetClass="entr" presetSubtype="4" fill="hold" grpId="0" nodeType="clickEffect">
+                                  <p:stCondLst>
+                                    <p:cond delay="0"/>
+                                  </p:stCondLst>
+                                  <p:childTnLst>
+                                    <p:set>
+                                      <p:cBhvr>
+                                        <p:cTn id="6" dur="1" fill="hold">
+                                          <p:stCondLst>
+                                            <p:cond delay="0"/>
+                                          </p:stCondLst>
+                                        </p:cTn>
+                                        <p:tgtEl>
+                                          <p:spTgt spid="3">
+                                            <p:txEl>
+                                              <p:pRg st="0" end="0"/>
+                                            </p:txEl>
+                                          </p:spTgt>
+                                        </p:tgtEl>
+                                        <p:attrNameLst>
+                                          <p:attrName>style.visibility</p:attrName>
+                                        </p:attrNameLst>
+                                      </p:cBhvr>
+                                      <p:to>
+                                        <p:strVal val="visible"/>
+                                      </p:to>
+                                    </p:set>
+                                    <p:anim calcmode="lin" valueType="num">
+                                      <p:cBhvr additive="base">
+                                        <p:cTn id="7" dur="500" fill="hold"/>
+                                        <p:tgtEl>
+                                          <p:spTgt spid="3">
+                                            <p:txEl>
+                                              <p:pRg st="0" end="0"/>
+                                            </p:txEl>
+                                          </p:spTgt>
+                                        </p:tgtEl>
+                                        <p:attrNameLst>
+                                          <p:attrName>ppt_x</p:attrName>
+                                        </p:attrNameLst>
+                                      </p:cBhvr>
+                                      <p:tavLst>
+                                        <p:tav tm="0">
+                                          <p:val>
+                                            <p:strVal val="#ppt_x"/>
+                                          </p:val>
+                                        </p:tav>
+                                        <p:tav tm="100000">
+                                          <p:val>
+                                            <p:strVal val="#ppt_x"/>
+                                          </p:val>
+                                        </p:tav>
+                                      </p:tavLst>
+                                    </p:anim>
+                                    <p:anim calcmode="lin" valueType="num">
+                                      <p:cBhvr additive="base">
+                                        <p:cTn id="8" dur="500" fill="hold"/>
+                                        <p:tgtEl>
+                                          <p:spTgt spid="3">
+                                            <p:txEl>
+                                              <p:pRg st="0" end="0"/>
+                                            </p:txEl>
+                                          </p:spTgt>
+                                        </p:tgtEl>
+                                        <p:attrNameLst>
+                                          <p:attrName>ppt_y</p:attrName>
+                                        </p:attrNameLst>
+                                      </p:cBhvr>
+                                      <p:tavLst>
+                                        <p:tav tm="0">
+                                          <p:val>
+                                            <p:strVal val="1+#ppt_h/2"/>
+                                          </p:val>
+                                        </p:tav>
+                                        <p:tav tm="100000">
+                                          <p:val>
+                                            <p:strVal val="#ppt_y"/>
+                                          </p:val>
+                                        </p:tav>
+                                      </p:tavLst>
+                                    </p:anim>
+                                  </p:childTnLst>
+                                </p:cTn>
+                              </p:par>
+                            </p:childTnLst>
+                          </p:cTn>
+                        </p:par>
+                      </p:childTnLst>
+                    </p:cTn>
+                  </p:par>
+                  <p:par>
+                    <p:cTn id="9" fill="hold">
+                      <p:stCondLst>
+                        <p:cond delay="indefinite"/>
+                      </p:stCondLst>
+                      <p:childTnLst>
+                        <p:par>
+                          <p:cTn id="10" fill="hold">
+                            <p:stCondLst>
+                              <p:cond delay="0"/>
+                            </p:stCondLst>
+                            <p:childTnLst>
+                              <p:par>
+                                <p:cTn id="11" presetID="2" presetClass="entr" presetSubtype="4" fill="hold" grpId="0" nodeType="clickEffect">
+                                  <p:stCondLst>
+                                    <p:cond delay="0"/>
+                                  </p:stCondLst>
+                                  <p:childTnLst>
+                                    <p:set>
+                                      <p:cBhvr>
+                                        <p:cTn id="12" dur="1" fill="hold">
+                                          <p:stCondLst>
+                                            <p:cond delay="0"/>
+                                          </p:stCondLst>
+                                        </p:cTn>
+                                        <p:tgtEl>
+                                          <p:spTgt spid="3">
+                                            <p:txEl>
+                                              <p:pRg st="1" end="1"/>
+                                            </p:txEl>
+                                          </p:spTgt>
+                                        </p:tgtEl>
+                                        <p:attrNameLst>
+                                          <p:attrName>style.visibility</p:attrName>
+                                        </p:attrNameLst>
+                                      </p:cBhvr>
+                                      <p:to>
+                                        <p:strVal val="visible"/>
+                                      </p:to>
+                                    </p:set>
+                                    <p:anim calcmode="lin" valueType="num">
+                                      <p:cBhvr additive="base">
+                                        <p:cTn id="13" dur="500" fill="hold"/>
+                                        <p:tgtEl>
+                                          <p:spTgt spid="3">
+                                            <p:txEl>
+                                              <p:pRg st="1" end="1"/>
+                                            </p:txEl>
+                                          </p:spTgt>
+                                        </p:tgtEl>
+                                        <p:attrNameLst>
+                                          <p:attrName>ppt_x</p:attrName>
+                                        </p:attrNameLst>
+                                      </p:cBhvr>
+                                      <p:tavLst>
+                                        <p:tav tm="0">
+                                          <p:val>
+                                            <p:strVal val="#ppt_x"/>
+                                          </p:val>
+                                        </p:tav>
+                                        <p:tav tm="100000">
+                                          <p:val>
+                                            <p:strVal val="#ppt_x"/>
+                                          </p:val>
+                                        </p:tav>
+                                      </p:tavLst>
+                                    </p:anim>
+                                    <p:anim calcmode="lin" valueType="num">
+                                      <p:cBhvr additive="base">
+                                        <p:cTn id="14" dur="500" fill="hold"/>
+                                        <p:tgtEl>
+                                          <p:spTgt spid="3">
+                                            <p:txEl>
+                                              <p:pRg st="1" end="1"/>
+                                            </p:txEl>
+                                          </p:spTgt>
+                                        </p:tgtEl>
+                                        <p:attrNameLst>
+                                          <p:attrName>ppt_y</p:attrName>
+                                        </p:attrNameLst>
+                                      </p:cBhvr>
+                                      <p:tavLst>
+                                        <p:tav tm="0">
+                                          <p:val>
+                                            <p:strVal val="1+#ppt_h/2"/>
+                                          </p:val>
+                                        </p:tav>
+                                        <p:tav tm="100000">
+                                          <p:val>
+                                            <p:strVal val="#ppt_y"/>
+                                          </p:val>
+                                        </p:tav>
+                                      </p:tavLst>
+                                    </p:anim>
+                                  </p:childTnLst>
+                                </p:cTn>
+                              </p:par>
+                            </p:childTnLst>
+                          </p:cTn>
+                        </p:par>
+                      </p:childTnLst>
+                    </p:cTn>
+                  </p:par>
+                  <p:par>
+                    <p:cTn id="15" fill="hold">
+                      <p:stCondLst>
+                        <p:cond delay="indefinite"/>
+                      </p:stCondLst>
+                      <p:childTnLst>
+                        <p:par>
+                          <p:cTn id="16" fill="hold">
+                            <p:stCondLst>
+                              <p:cond delay="0"/>
+                            </p:stCondLst>
+                            <p:childTnLst>
+                              <p:par>
+                                <p:cTn id="17" presetID="2" presetClass="entr" presetSubtype="4" fill="hold" grpId="0" nodeType="clickEffect">
+                                  <p:stCondLst>
+                                    <p:cond delay="0"/>
+                                  </p:stCondLst>
+                                  <p:childTnLst>
+                                    <p:set>
+                                      <p:cBhvr>
+                                        <p:cTn id="18" dur="1" fill="hold">
+                                          <p:stCondLst>
+                                            <p:cond delay="0"/>
+                                          </p:stCondLst>
+                                        </p:cTn>
+                                        <p:tgtEl>
+                                          <p:spTgt spid="3">
+                                            <p:txEl>
+                                              <p:pRg st="2" end="2"/>
+                                            </p:txEl>
+                                          </p:spTgt>
+                                        </p:tgtEl>
+                                        <p:attrNameLst>
+                                          <p:attrName>style.visibility</p:attrName>
+                                        </p:attrNameLst>
+                                      </p:cBhvr>
+                                      <p:to>
+                                        <p:strVal val="visible"/>
+                                      </p:to>
+                                    </p:set>
+                                    <p:anim calcmode="lin" valueType="num">
+                                      <p:cBhvr additive="base">
+                                        <p:cTn id="19" dur="500" fill="hold"/>
+                                        <p:tgtEl>
+                                          <p:spTgt spid="3">
+                                            <p:txEl>
+                                              <p:pRg st="2" end="2"/>
+                                            </p:txEl>
+                                          </p:spTgt>
+                                        </p:tgtEl>
+                                        <p:attrNameLst>
+                                          <p:attrName>ppt_x</p:attrName>
+                                        </p:attrNameLst>
+                                      </p:cBhvr>
+                                      <p:tavLst>
+                                        <p:tav tm="0">
+                                          <p:val>
+                                            <p:strVal val="#ppt_x"/>
+                                          </p:val>
+                                        </p:tav>
+                                        <p:tav tm="100000">
+                                          <p:val>
+                                            <p:strVal val="#ppt_x"/>
+                                          </p:val>
+                                        </p:tav>
+                                      </p:tavLst>
+                                    </p:anim>
+                                    <p:anim calcmode="lin" valueType="num">
+                                      <p:cBhvr additive="base">
+                                        <p:cTn id="20" dur="500" fill="hold"/>
+                                        <p:tgtEl>
+                                          <p:spTgt spid="3">
+                                            <p:txEl>
+                                              <p:pRg st="2" end="2"/>
+                                            </p:txEl>
+                                          </p:spTgt>
+                                        </p:tgtEl>
+                                        <p:attrNameLst>
+                                          <p:attrName>ppt_y</p:attrName>
+                                        </p:attrNameLst>
+                                      </p:cBhvr>
+                                      <p:tavLst>
+                                        <p:tav tm="0">
+                                          <p:val>
+                                            <p:strVal val="1+#ppt_h/2"/>
+                                          </p:val>
+                                        </p:tav>
+                                        <p:tav tm="100000">
+                                          <p:val>
+                                            <p:strVal val="#ppt_y"/>
+                                          </p:val>
+                                        </p:tav>
+                                      </p:tavLst>
+                                    </p:anim>
+                                  </p:childTnLst>
+                                </p:cTn>
+                              </p:par>
+                            </p:childTnLst>
+                          </p:cTn>
+                        </p:par>
+                      </p:childTnLst>
+                    </p:cTn>
+                  </p:par>
+                  <p:par>
+                    <p:cTn id="21" fill="hold">
+                      <p:stCondLst>
+                        <p:cond delay="indefinite"/>
+                      </p:stCondLst>
+                      <p:childTnLst>
+                        <p:par>
+                          <p:cTn id="22" fill="hold">
+                            <p:stCondLst>
+                              <p:cond delay="0"/>
+                            </p:stCondLst>
+                            <p:childTnLst>
+                              <p:par>
+                                <p:cTn id="23" presetID="2" presetClass="entr" presetSubtype="4" fill="hold" grpId="0" nodeType="clickEffect">
+                                  <p:stCondLst>
+                                    <p:cond delay="0"/>
+                                  </p:stCondLst>
+                                  <p:childTnLst>
+                                    <p:set>
+                                      <p:cBhvr>
+                                        <p:cTn id="24" dur="1" fill="hold">
+                                          <p:stCondLst>
+                                            <p:cond delay="0"/>
+                                          </p:stCondLst>
+                                        </p:cTn>
+                                        <p:tgtEl>
+                                          <p:spTgt spid="3">
+                                            <p:txEl>
+                                              <p:pRg st="3" end="3"/>
+                                            </p:txEl>
+                                          </p:spTgt>
+                                        </p:tgtEl>
+                                        <p:attrNameLst>
+                                          <p:attrName>style.visibility</p:attrName>
+                                        </p:attrNameLst>
+                                      </p:cBhvr>
+                                      <p:to>
+                                        <p:strVal val="visible"/>
+                                      </p:to>
+                                    </p:set>
+                                    <p:anim calcmode="lin" valueType="num">
+                                      <p:cBhvr additive="base">
+                                        <p:cTn id="25" dur="500" fill="hold"/>
+                                        <p:tgtEl>
+                                          <p:spTgt spid="3">
+                                            <p:txEl>
+                                              <p:pRg st="3" end="3"/>
+                                            </p:txEl>
+                                          </p:spTgt>
+                                        </p:tgtEl>
+                                        <p:attrNameLst>
+                                          <p:attrName>ppt_x</p:attrName>
+                                        </p:attrNameLst>
+                                      </p:cBhvr>
+                                      <p:tavLst>
+                                        <p:tav tm="0">
+                                          <p:val>
+                                            <p:strVal val="#ppt_x"/>
+                                          </p:val>
+                                        </p:tav>
+                                        <p:tav tm="100000">
+                                          <p:val>
+                                            <p:strVal val="#ppt_x"/>
+                                          </p:val>
+                                        </p:tav>
+                                      </p:tavLst>
+                                    </p:anim>
+                                    <p:anim calcmode="lin" valueType="num">
+                                      <p:cBhvr additive="base">
+                                        <p:cTn id="26" dur="500" fill="hold"/>
+                                        <p:tgtEl>
+                                          <p:spTgt spid="3">
+                                            <p:txEl>
+                                              <p:pRg st="3" end="3"/>
+                                            </p:txEl>
+                                          </p:spTgt>
+                                        </p:tgtEl>
+                                        <p:attrNameLst>
+                                          <p:attrName>ppt_y</p:attrName>
+                                        </p:attrNameLst>
+                                      </p:cBhvr>
+                                      <p:tavLst>
+                                        <p:tav tm="0">
+                                          <p:val>
+                                            <p:strVal val="1+#ppt_h/2"/>
+                                          </p:val>
+                                        </p:tav>
+                                        <p:tav tm="100000">
+                                          <p:val>
+                                            <p:strVal val="#ppt_y"/>
+                                          </p:val>
+                                        </p:tav>
+                                      </p:tavLst>
+                                    </p:anim>
+                                  </p:childTnLst>
+                                </p:cTn>
+                              </p:par>
+                            </p:childTnLst>
+                          </p:cTn>
+                        </p:par>
+                      </p:childTnLst>
+                    </p:cTn>
+                  </p:par>
+                  <p:par>
+                    <p:cTn id="27" fill="hold">
+                      <p:stCondLst>
+                        <p:cond delay="indefinite"/>
+                      </p:stCondLst>
+                      <p:childTnLst>
+                        <p:par>
+                          <p:cTn id="28" fill="hold">
+                            <p:stCondLst>
+                              <p:cond delay="0"/>
+                            </p:stCondLst>
+                            <p:childTnLst>
+                              <p:par>
+                                <p:cTn id="29" presetID="2" presetClass="entr" presetSubtype="4" fill="hold" grpId="0" nodeType="clickEffect">
+                                  <p:stCondLst>
+                                    <p:cond delay="0"/>
+                                  </p:stCondLst>
+                                  <p:childTnLst>
+                                    <p:set>
+                                      <p:cBhvr>
+                                        <p:cTn id="30" dur="1" fill="hold">
+                                          <p:stCondLst>
+                                            <p:cond delay="0"/>
+                                          </p:stCondLst>
+                                        </p:cTn>
+                                        <p:tgtEl>
+                                          <p:spTgt spid="3">
+                                            <p:txEl>
+                                              <p:pRg st="4" end="4"/>
+                                            </p:txEl>
+                                          </p:spTgt>
+                                        </p:tgtEl>
+                                        <p:attrNameLst>
+                                          <p:attrName>style.visibility</p:attrName>
+                                        </p:attrNameLst>
+                                      </p:cBhvr>
+                                      <p:to>
+                                        <p:strVal val="visible"/>
+                                      </p:to>
+                                    </p:set>
+                                    <p:anim calcmode="lin" valueType="num">
+                                      <p:cBhvr additive="base">
+                                        <p:cTn id="31" dur="500" fill="hold"/>
+                                        <p:tgtEl>
+                                          <p:spTgt spid="3">
+                                            <p:txEl>
+                                              <p:pRg st="4" end="4"/>
+                                            </p:txEl>
+                                          </p:spTgt>
+                                        </p:tgtEl>
+                                        <p:attrNameLst>
+                                          <p:attrName>ppt_x</p:attrName>
+                                        </p:attrNameLst>
+                                      </p:cBhvr>
+                                      <p:tavLst>
+                                        <p:tav tm="0">
+                                          <p:val>
+                                            <p:strVal val="#ppt_x"/>
+                                          </p:val>
+                                        </p:tav>
+                                        <p:tav tm="100000">
+                                          <p:val>
+                                            <p:strVal val="#ppt_x"/>
+                                          </p:val>
+                                        </p:tav>
+                                      </p:tavLst>
+                                    </p:anim>
+                                    <p:anim calcmode="lin" valueType="num">
+                                      <p:cBhvr additive="base">
+                                        <p:cTn id="32" dur="500" fill="hold"/>
+                                        <p:tgtEl>
+                                          <p:spTgt spid="3">
+                                            <p:txEl>
+                                              <p:pRg st="4" end="4"/>
+                                            </p:txEl>
+                                          </p:spTgt>
+                                        </p:tgtEl>
+                                        <p:attrNameLst>
+                                          <p:attrName>ppt_y</p:attrName>
+                                        </p:attrNameLst>
+                                      </p:cBhvr>
+                                      <p:tavLst>
+                                        <p:tav tm="0">
+                                          <p:val>
+                                            <p:strVal val="1+#ppt_h/2"/>
+                                          </p:val>
+                                        </p:tav>
+                                        <p:tav tm="100000">
+                                          <p:val>
+                                            <p:strVal val="#ppt_y"/>
+                                          </p:val>
+                                        </p:tav>
+                                      </p:tavLst>
+                                    </p:anim>
+                                  </p:childTnLst>
+                                </p:cTn>
+                              </p:par>
+                            </p:childTnLst>
+                          </p:cTn>
+                        </p:par>
+                      </p:childTnLst>
+                    </p:cTn>
+                  </p:par>
+                  <p:par>
+                    <p:cTn id="33" fill="hold">
+                      <p:stCondLst>
+                        <p:cond delay="indefinite"/>
+                      </p:stCondLst>
+                      <p:childTnLst>
+                        <p:par>
+                          <p:cTn id="34" fill="hold">
+                            <p:stCondLst>
+                              <p:cond delay="0"/>
+                            </p:stCondLst>
+                            <p:childTnLst>
+                              <p:par>
+                                <p:cTn id="35" presetID="2" presetClass="entr" presetSubtype="4" fill="hold" grpId="0" nodeType="clickEffect">
+                                  <p:stCondLst>
+                                    <p:cond delay="0"/>
+                                  </p:stCondLst>
+                                  <p:childTnLst>
+                                    <p:set>
+                                      <p:cBhvr>
+                                        <p:cTn id="36" dur="1" fill="hold">
+                                          <p:stCondLst>
+                                            <p:cond delay="0"/>
+                                          </p:stCondLst>
+                                        </p:cTn>
+                                        <p:tgtEl>
+                                          <p:spTgt spid="3">
+                                            <p:txEl>
+                                              <p:pRg st="5" end="5"/>
+                                            </p:txEl>
+                                          </p:spTgt>
+                                        </p:tgtEl>
+                                        <p:attrNameLst>
+                                          <p:attrName>style.visibility</p:attrName>
+                                        </p:attrNameLst>
+                                      </p:cBhvr>
+                                      <p:to>
+                                        <p:strVal val="visible"/>
+                                      </p:to>
+                                    </p:set>
+                                    <p:anim calcmode="lin" valueType="num">
+                                      <p:cBhvr additive="base">
+                                        <p:cTn id="37" dur="500" fill="hold"/>
+                                        <p:tgtEl>
+                                          <p:spTgt spid="3">
+                                            <p:txEl>
+                                              <p:pRg st="5" end="5"/>
+                                            </p:txEl>
+                                          </p:spTgt>
+                                        </p:tgtEl>
+                                        <p:attrNameLst>
+                                          <p:attrName>ppt_x</p:attrName>
+                                        </p:attrNameLst>
+                                      </p:cBhvr>
+                                      <p:tavLst>
+                                        <p:tav tm="0">
+                                          <p:val>
+                                            <p:strVal val="#ppt_x"/>
+                                          </p:val>
+                                        </p:tav>
+                                        <p:tav tm="100000">
+                                          <p:val>
+                                            <p:strVal val="#ppt_x"/>
+                                          </p:val>
+                                        </p:tav>
+                                      </p:tavLst>
+                                    </p:anim>
+                                    <p:anim calcmode="lin" valueType="num">
+                                      <p:cBhvr additive="base">
+                                        <p:cTn id="38" dur="500" fill="hold"/>
+                                        <p:tgtEl>
+                                          <p:spTgt spid="3">
+                                            <p:txEl>
+                                              <p:pRg st="5" end="5"/>
+                                            </p:txEl>
+                                          </p:spTgt>
+                                        </p:tgtEl>
+                                        <p:attrNameLst>
+                                          <p:attrName>ppt_y</p:attrName>
+                                        </p:attrNameLst>
+                                      </p:cBhvr>
+                                      <p:tavLst>
+                                        <p:tav tm="0">
+                                          <p:val>
+                                            <p:strVal val="1+#ppt_h/2"/>
+                                          </p:val>
+                                        </p:tav>
+                                        <p:tav tm="100000">
+                                          <p:val>
+                                            <p:strVal val="#ppt_y"/>
+                                          </p:val>
+                                        </p:tav>
+                                      </p:tavLst>
+                                    </p:anim>
+                                  </p:childTnLst>
+                                </p:cTn>
+                              </p:par>
+                            </p:childTnLst>
+                          </p:cTn>
+                        </p:par>
+                      </p:childTnLst>
+                    </p:cTn>
+                  </p:par>
+                  <p:par>
+                    <p:cTn id="39" fill="hold">
+                      <p:stCondLst>
+                        <p:cond delay="indefinite"/>
+                      </p:stCondLst>
+                      <p:childTnLst>
+                        <p:par>
+                          <p:cTn id="40" fill="hold">
+                            <p:stCondLst>
+                              <p:cond delay="0"/>
+                            </p:stCondLst>
+                            <p:childTnLst>
+                              <p:par>
+                                <p:cTn id="41" presetID="2" presetClass="entr" presetSubtype="4" fill="hold" grpId="0" nodeType="clickEffect">
+                                  <p:stCondLst>
+                                    <p:cond delay="0"/>
+                                  </p:stCondLst>
+                                  <p:childTnLst>
+                                    <p:set>
+                                      <p:cBhvr>
+                                        <p:cTn id="42" dur="1" fill="hold">
+                                          <p:stCondLst>
+                                            <p:cond delay="0"/>
+                                          </p:stCondLst>
+                                        </p:cTn>
+                                        <p:tgtEl>
+                                          <p:spTgt spid="3">
+                                            <p:txEl>
+                                              <p:pRg st="6" end="6"/>
+                                            </p:txEl>
+                                          </p:spTgt>
+                                        </p:tgtEl>
+                                        <p:attrNameLst>
+                                          <p:attrName>style.visibility</p:attrName>
+                                        </p:attrNameLst>
+                                      </p:cBhvr>
+                                      <p:to>
+                                        <p:strVal val="visible"/>
+                                      </p:to>
+                                    </p:set>
+                                    <p:anim calcmode="lin" valueType="num">
+                                      <p:cBhvr additive="base">
+                                        <p:cTn id="43" dur="500" fill="hold"/>
+                                        <p:tgtEl>
+                                          <p:spTgt spid="3">
+                                            <p:txEl>
+                                              <p:pRg st="6" end="6"/>
+                                            </p:txEl>
+                                          </p:spTgt>
+                                        </p:tgtEl>
+                                        <p:attrNameLst>
+                                          <p:attrName>ppt_x</p:attrName>
+                                        </p:attrNameLst>
+                                      </p:cBhvr>
+                                      <p:tavLst>
+                                        <p:tav tm="0">
+                                          <p:val>
+                                            <p:strVal val="#ppt_x"/>
+                                          </p:val>
+                                        </p:tav>
+                                        <p:tav tm="100000">
+                                          <p:val>
+                                            <p:strVal val="#ppt_x"/>
+                                          </p:val>
+                                        </p:tav>
+                                      </p:tavLst>
+                                    </p:anim>
+                                    <p:anim calcmode="lin" valueType="num">
+                                      <p:cBhvr additive="base">
+                                        <p:cTn id="44" dur="500" fill="hold"/>
+                                        <p:tgtEl>
+                                          <p:spTgt spid="3">
+                                            <p:txEl>
+                                              <p:pRg st="6" end="6"/>
+                                            </p:txEl>
+                                          </p:spTgt>
+                                        </p:tgtEl>
+                                        <p:attrNameLst>
+                                          <p:attrName>ppt_y</p:attrName>
+                                        </p:attrNameLst>
+                                      </p:cBhvr>
+                                      <p:tavLst>
+                                        <p:tav tm="0">
+                                          <p:val>
+                                            <p:strVal val="1+#ppt_h/2"/>
+                                          </p:val>
+                                        </p:tav>
+                                        <p:tav tm="100000">
+                                          <p:val>
+                                            <p:strVal val="#ppt_y"/>
+                                          </p:val>
+                                        </p:tav>
+                                      </p:tavLst>
+                                    </p:anim>
+                                  </p:childTnLst>
+                                </p:cTn>
+                              </p:par>
+                              <p:par>
+                                <p:cTn id="45" presetID="2" presetClass="entr" presetSubtype="4" fill="hold" grpId="0" nodeType="withEffect">
+                                  <p:stCondLst>
+                                    <p:cond delay="0"/>
+                                  </p:stCondLst>
+                                  <p:childTnLst>
+                                    <p:set>
+                                      <p:cBhvr>
+                                        <p:cTn id="46" dur="1" fill="hold">
+                                          <p:stCondLst>
+                                            <p:cond delay="0"/>
+                                          </p:stCondLst>
+                                        </p:cTn>
+                                        <p:tgtEl>
+                                          <p:spTgt spid="3">
+                                            <p:txEl>
+                                              <p:pRg st="7" end="7"/>
+                                            </p:txEl>
+                                          </p:spTgt>
+                                        </p:tgtEl>
+                                        <p:attrNameLst>
+                                          <p:attrName>style.visibility</p:attrName>
+                                        </p:attrNameLst>
+                                      </p:cBhvr>
+                                      <p:to>
+                                        <p:strVal val="visible"/>
+                                      </p:to>
+                                    </p:set>
+                                    <p:anim calcmode="lin" valueType="num">
+                                      <p:cBhvr additive="base">
+                                        <p:cTn id="47" dur="500" fill="hold"/>
+                                        <p:tgtEl>
+                                          <p:spTgt spid="3">
+                                            <p:txEl>
+                                              <p:pRg st="7" end="7"/>
+                                            </p:txEl>
+                                          </p:spTgt>
+                                        </p:tgtEl>
+                                        <p:attrNameLst>
+                                          <p:attrName>ppt_x</p:attrName>
+                                        </p:attrNameLst>
+                                      </p:cBhvr>
+                                      <p:tavLst>
+                                        <p:tav tm="0">
+                                          <p:val>
+                                            <p:strVal val="#ppt_x"/>
+                                          </p:val>
+                                        </p:tav>
+                                        <p:tav tm="100000">
+                                          <p:val>
+                                            <p:strVal val="#ppt_x"/>
+                                          </p:val>
+                                        </p:tav>
+                                      </p:tavLst>
+                                    </p:anim>
+                                    <p:anim calcmode="lin" valueType="num">
+                                      <p:cBhvr additive="base">
+                                        <p:cTn id="48" dur="500" fill="hold"/>
+                                        <p:tgtEl>
+                                          <p:spTgt spid="3">
+                                            <p:txEl>
+                                              <p:pRg st="7" end="7"/>
+                                            </p:txEl>
+                                          </p:spTgt>
+                                        </p:tgtEl>
+                                        <p:attrNameLst>
+                                          <p:attrName>ppt_y</p:attrName>
+                                        </p:attrNameLst>
+                                      </p:cBhvr>
+                                      <p:tavLst>
+                                        <p:tav tm="0">
+                                          <p:val>
+                                            <p:strVal val="1+#ppt_h/2"/>
+                                          </p:val>
+                                        </p:tav>
+                                        <p:tav tm="100000">
+                                          <p:val>
+                                            <p:strVal val="#ppt_y"/>
+                                          </p:val>
+                                        </p:tav>
+                                      </p:tavLst>
+                                    </p:anim>
+                                  </p:childTnLst>
+                                </p:cTn>
+                              </p:par>
+                            </p:childTnLst>
+                          </p:cTn>
+                        </p:par>
+                      </p:childTnLst>
+                    </p:cTn>
+                  </p:par>
+                  <p:par>
+                    <p:cTn id="49" fill="hold">
+                      <p:stCondLst>
+                        <p:cond delay="indefinite"/>
+                      </p:stCondLst>
+                      <p:childTnLst>
+                        <p:par>
+                          <p:cTn id="50" fill="hold">
+                            <p:stCondLst>
+                              <p:cond delay="0"/>
+                            </p:stCondLst>
+                            <p:childTnLst>
+                              <p:par>
+                                <p:cTn id="51" presetID="2" presetClass="entr" presetSubtype="4" fill="hold" grpId="0" nodeType="clickEffect">
+                                  <p:stCondLst>
+                                    <p:cond delay="0"/>
+                                  </p:stCondLst>
+                                  <p:childTnLst>
+                                    <p:set>
+                                      <p:cBhvr>
+                                        <p:cTn id="52" dur="1" fill="hold">
+                                          <p:stCondLst>
+                                            <p:cond delay="0"/>
+                                          </p:stCondLst>
+                                        </p:cTn>
+                                        <p:tgtEl>
+                                          <p:spTgt spid="3">
+                                            <p:txEl>
+                                              <p:pRg st="8" end="8"/>
+                                            </p:txEl>
+                                          </p:spTgt>
+                                        </p:tgtEl>
+                                        <p:attrNameLst>
+                                          <p:attrName>style.visibility</p:attrName>
+                                        </p:attrNameLst>
+                                      </p:cBhvr>
+                                      <p:to>
+                                        <p:strVal val="visible"/>
+                                      </p:to>
+                                    </p:set>
+                                    <p:anim calcmode="lin" valueType="num">
+                                      <p:cBhvr additive="base">
+                                        <p:cTn id="53" dur="500" fill="hold"/>
+                                        <p:tgtEl>
+                                          <p:spTgt spid="3">
+                                            <p:txEl>
+                                              <p:pRg st="8" end="8"/>
+                                            </p:txEl>
+                                          </p:spTgt>
+                                        </p:tgtEl>
+                                        <p:attrNameLst>
+                                          <p:attrName>ppt_x</p:attrName>
+                                        </p:attrNameLst>
+                                      </p:cBhvr>
+                                      <p:tavLst>
+                                        <p:tav tm="0">
+                                          <p:val>
+                                            <p:strVal val="#ppt_x"/>
+                                          </p:val>
+                                        </p:tav>
+                                        <p:tav tm="100000">
+                                          <p:val>
+                                            <p:strVal val="#ppt_x"/>
+                                          </p:val>
+                                        </p:tav>
+                                      </p:tavLst>
+                                    </p:anim>
+                                    <p:anim calcmode="lin" valueType="num">
+                                      <p:cBhvr additive="base">
+                                        <p:cTn id="54" dur="500" fill="hold"/>
+                                        <p:tgtEl>
+                                          <p:spTgt spid="3">
+                                            <p:txEl>
+                                              <p:pRg st="8" end="8"/>
+                                            </p:txEl>
+                                          </p:spTgt>
+                                        </p:tgtEl>
+                                        <p:attrNameLst>
+                                          <p:attrName>ppt_y</p:attrName>
+                                        </p:attrNameLst>
+                                      </p:cBhvr>
+                                      <p:tavLst>
+                                        <p:tav tm="0">
+                                          <p:val>
+                                            <p:strVal val="1+#ppt_h/2"/>
+                                          </p:val>
+                                        </p:tav>
+                                        <p:tav tm="100000">
+                                          <p:val>
+                                            <p:strVal val="#ppt_y"/>
+                                          </p:val>
+                                        </p:tav>
+                                      </p:tavLst>
+                                    </p:anim>
+                                  </p:childTnLst>
+                                </p:cTn>
+                              </p:par>
+                            </p:childTnLst>
+                          </p:cTn>
+                        </p:par>
+                      </p:childTnLst>
+                    </p:cTn>
+                  </p:par>
+                </p:childTnLst>
+              </p:cTn>
+              <p:prevCondLst>
+                <p:cond evt="onPrev" delay="0">
+                  <p:tgtEl>
+                    <p:sldTgt/>
+                  </p:tgtEl>
+                </p:cond>
+              </p:prevCondLst>
+              <p:nextCondLst>
+                <p:cond evt="onNext" delay="0">
+                  <p:tgtEl>
+                    <p:sldTgt/>
+                  </p:tgtEl>
+                </p:cond>
+              </p:nextCondLst>
+            </p:seq>
+          </p:childTnLst>
+        </p:cTn>
+      </p:par>
+    </p:tnLst>
+    <p:bldLst>
+      <p:bldP spid="3" grpId="0" build="p"/>
+    </p:bldLst>
+  </p:timing>
+</p:sld>
+</file>
+
+<file path=ppt/slides/slide6.xml><?xml version="1.0" encoding="utf-8"?>
+<p:sld xmlns:a="http://schemas.openxmlformats.org/drawingml/2006/main" xmlns:r="http://schemas.openxmlformats.org/officeDocument/2006/relationships" xmlns:p="http://schemas.openxmlformats.org/presentationml/2006/main">
+  <p:cSld>
+    <p:spTree>
+      <p:nvGrpSpPr>
+        <p:cNvPr id="1" name=""/>
+        <p:cNvGrpSpPr/>
+        <p:nvPr/>
+      </p:nvGrpSpPr>
+      <p:grpSpPr>
+        <a:xfrm>
+          <a:off x="0" y="0"/>
+          <a:ext cx="0" cy="0"/>
+          <a:chOff x="0" y="0"/>
+          <a:chExt cx="0" cy="0"/>
+        </a:xfrm>
+      </p:grpSpPr>
+      <p:sp>
+        <p:nvSpPr>
+          <p:cNvPr id="6145" name="Title 1"/>
+          <p:cNvSpPr>
+            <a:spLocks noGrp="1"/>
+          </p:cNvSpPr>
+          <p:nvPr>
+            <p:ph type="title"/>
+          </p:nvPr>
+        </p:nvSpPr>
+        <p:spPr>
+          <a:xfrm>
+            <a:off x="1042988" y="455613"/>
+            <a:ext cx="7024687" cy="1143000"/>
+          </a:xfrm>
+        </p:spPr>
+        <p:txBody>
+          <a:bodyPr/>
+          <a:lstStyle/>
+          <a:p>
+            <a:r>
+              <a:rPr lang="en-US" dirty="0" smtClean="0">
+                <a:latin typeface="Century Gothic" charset="0"/>
+              </a:rPr>
+              <a:t>Directions</a:t>
+            </a:r>
+            <a:endParaRPr lang="en-US" dirty="0">
+              <a:latin typeface="Century Gothic" charset="0"/>
+            </a:endParaRPr>
+          </a:p>
+        </p:txBody>
+      </p:sp>
+      <p:sp>
+        <p:nvSpPr>
+          <p:cNvPr id="6147" name="Slide Number Placeholder 4"/>
+          <p:cNvSpPr>
+            <a:spLocks noGrp="1"/>
+          </p:cNvSpPr>
+          <p:nvPr>
+            <p:ph type="sldNum" sz="quarter" idx="12"/>
+          </p:nvPr>
+        </p:nvSpPr>
+        <p:spPr bwMode="auto">
+          <a:noFill/>
+          <a:extLst>
+            <a:ext uri="{909E8E84-426E-40dd-AFC4-6F175D3DCCD1}">
+              <a14:hiddenFill xmlns:a14="http://schemas.microsoft.com/office/drawing/2010/main">
+                <a:solidFill>
+                  <a:srgbClr val="FFFFFF"/>
+                </a:solidFill>
+              </a14:hiddenFill>
+            </a:ext>
+            <a:ext uri="{91240B29-F687-4f45-9708-019B960494DF}">
+              <a14:hiddenLine xmlns:a14="http://schemas.microsoft.com/office/drawing/2010/main" w="9525">
+                <a:solidFill>
+                  <a:srgbClr val="000000"/>
+                </a:solidFill>
+                <a:miter lim="800000"/>
+                <a:headEnd/>
+                <a:tailEnd/>
+              </a14:hiddenLine>
+            </a:ext>
+          </a:extLst>
+        </p:spPr>
+        <p:txBody>
+          <a:bodyPr wrap="square" numCol="1" anchorCtr="0" compatLnSpc="1">
+            <a:prstTxWarp prst="textNoShape">
+              <a:avLst/>
+            </a:prstTxWarp>
+          </a:bodyPr>
+          <a:lstStyle>
+            <a:lvl1pPr>
+              <a:defRPr>
+                <a:solidFill>
+                  <a:schemeClr val="tx1"/>
+                </a:solidFill>
+                <a:latin typeface="Century Gothic" charset="0"/>
+                <a:ea typeface="ＭＳ Ｐゴシック" charset="0"/>
+                <a:cs typeface="ＭＳ Ｐゴシック" charset="0"/>
+              </a:defRPr>
+            </a:lvl1pPr>
+            <a:lvl2pPr marL="742950" indent="-285750">
+              <a:defRPr>
+                <a:solidFill>
+                  <a:schemeClr val="tx1"/>
+                </a:solidFill>
+                <a:latin typeface="Century Gothic" charset="0"/>
+                <a:ea typeface="ＭＳ Ｐゴシック" charset="0"/>
+              </a:defRPr>
+            </a:lvl2pPr>
+            <a:lvl3pPr marL="1143000" indent="-228600">
+              <a:defRPr>
+                <a:solidFill>
+                  <a:schemeClr val="tx1"/>
+                </a:solidFill>
+                <a:latin typeface="Century Gothic" charset="0"/>
+                <a:ea typeface="ＭＳ Ｐゴシック" charset="0"/>
+              </a:defRPr>
+            </a:lvl3pPr>
+            <a:lvl4pPr marL="1600200" indent="-228600">
+              <a:defRPr>
+                <a:solidFill>
+                  <a:schemeClr val="tx1"/>
+                </a:solidFill>
+                <a:latin typeface="Century Gothic" charset="0"/>
+                <a:ea typeface="ＭＳ Ｐゴシック" charset="0"/>
+              </a:defRPr>
+            </a:lvl4pPr>
+            <a:lvl5pPr marL="2057400" indent="-228600">
+              <a:defRPr>
+                <a:solidFill>
+                  <a:schemeClr val="tx1"/>
+                </a:solidFill>
+                <a:latin typeface="Century Gothic" charset="0"/>
+                <a:ea typeface="ＭＳ Ｐゴシック" charset="0"/>
+              </a:defRPr>
+            </a:lvl5pPr>
+            <a:lvl6pPr marL="2514600" indent="-228600" fontAlgn="base">
+              <a:spcBef>
+                <a:spcPct val="0"/>
+              </a:spcBef>
+              <a:spcAft>
+                <a:spcPct val="0"/>
+              </a:spcAft>
+              <a:defRPr>
+                <a:solidFill>
+                  <a:schemeClr val="tx1"/>
+                </a:solidFill>
+                <a:latin typeface="Century Gothic" charset="0"/>
+                <a:ea typeface="ＭＳ Ｐゴシック" charset="0"/>
+              </a:defRPr>
+            </a:lvl6pPr>
+            <a:lvl7pPr marL="2971800" indent="-228600" fontAlgn="base">
+              <a:spcBef>
+                <a:spcPct val="0"/>
+              </a:spcBef>
+              <a:spcAft>
+                <a:spcPct val="0"/>
+              </a:spcAft>
+              <a:defRPr>
+                <a:solidFill>
+                  <a:schemeClr val="tx1"/>
+                </a:solidFill>
+                <a:latin typeface="Century Gothic" charset="0"/>
+                <a:ea typeface="ＭＳ Ｐゴシック" charset="0"/>
+              </a:defRPr>
+            </a:lvl7pPr>
+            <a:lvl8pPr marL="3429000" indent="-228600" fontAlgn="base">
+              <a:spcBef>
+                <a:spcPct val="0"/>
+              </a:spcBef>
+              <a:spcAft>
+                <a:spcPct val="0"/>
+              </a:spcAft>
+              <a:defRPr>
+                <a:solidFill>
+                  <a:schemeClr val="tx1"/>
+                </a:solidFill>
+                <a:latin typeface="Century Gothic" charset="0"/>
+                <a:ea typeface="ＭＳ Ｐゴシック" charset="0"/>
+              </a:defRPr>
+            </a:lvl8pPr>
+            <a:lvl9pPr marL="3886200" indent="-228600" fontAlgn="base">
+              <a:spcBef>
+                <a:spcPct val="0"/>
+              </a:spcBef>
+              <a:spcAft>
+                <a:spcPct val="0"/>
+              </a:spcAft>
+              <a:defRPr>
+                <a:solidFill>
+                  <a:schemeClr val="tx1"/>
+                </a:solidFill>
+                <a:latin typeface="Century Gothic" charset="0"/>
+                <a:ea typeface="ＭＳ Ｐゴシック" charset="0"/>
+              </a:defRPr>
+            </a:lvl9pPr>
+          </a:lstStyle>
+          <a:p>
+            <a:pPr fontAlgn="base">
+              <a:spcBef>
+                <a:spcPct val="0"/>
+              </a:spcBef>
+              <a:spcAft>
+                <a:spcPct val="0"/>
+              </a:spcAft>
+            </a:pPr>
+            <a:fld id="{9B6F7E0B-2963-1842-872C-CA99E62BCD77}" type="slidenum">
+              <a:rPr lang="en-US">
+                <a:solidFill>
+                  <a:srgbClr val="FEFEFE"/>
+                </a:solidFill>
+              </a:rPr>
+              <a:pPr fontAlgn="base">
+                <a:spcBef>
+                  <a:spcPct val="0"/>
+                </a:spcBef>
+                <a:spcAft>
+                  <a:spcPct val="0"/>
+                </a:spcAft>
+              </a:pPr>
+              <a:t>6</a:t>
+            </a:fld>
+            <a:endParaRPr lang="en-US">
+              <a:solidFill>
+                <a:srgbClr val="FEFEFE"/>
+              </a:solidFill>
+            </a:endParaRPr>
+          </a:p>
+        </p:txBody>
+      </p:sp>
+      <p:pic>
+        <p:nvPicPr>
+          <p:cNvPr id="4" name="Picture 3" descr="72883965.png"/>
+          <p:cNvPicPr>
+            <a:picLocks noChangeAspect="1"/>
+          </p:cNvPicPr>
+          <p:nvPr/>
+        </p:nvPicPr>
+        <p:blipFill>
+          <a:blip r:embed="rId3" cstate="print">
+            <a:extLst>
+              <a:ext uri="{28A0092B-C50C-407E-A947-70E740481C1C}">
+                <a14:useLocalDpi xmlns:a14="http://schemas.microsoft.com/office/drawing/2010/main" val="0"/>
+              </a:ext>
+            </a:extLst>
+          </a:blip>
+          <a:stretch>
+            <a:fillRect/>
+          </a:stretch>
+        </p:blipFill>
+        <p:spPr>
+          <a:xfrm>
+            <a:off x="569609" y="1598613"/>
+            <a:ext cx="1750258" cy="1071913"/>
+          </a:xfrm>
+          <a:prstGeom prst="rect">
+            <a:avLst/>
+          </a:prstGeom>
+        </p:spPr>
+      </p:pic>
+      <p:pic>
+        <p:nvPicPr>
+          <p:cNvPr id="5" name="Picture 4" descr="skd188803sdc.png"/>
+          <p:cNvPicPr>
+            <a:picLocks noChangeAspect="1"/>
+          </p:cNvPicPr>
+          <p:nvPr/>
+        </p:nvPicPr>
+        <p:blipFill rotWithShape="1">
+          <a:blip r:embed="rId4" cstate="print">
+            <a:extLst>
+              <a:ext uri="{28A0092B-C50C-407E-A947-70E740481C1C}">
+                <a14:useLocalDpi xmlns:a14="http://schemas.microsoft.com/office/drawing/2010/main" val="0"/>
+              </a:ext>
+            </a:extLst>
+          </a:blip>
+          <a:srcRect l="57303"/>
+          <a:stretch/>
+        </p:blipFill>
+        <p:spPr>
+          <a:xfrm>
+            <a:off x="3657600" y="2423620"/>
+            <a:ext cx="1484942" cy="2874360"/>
+          </a:xfrm>
+          <a:prstGeom prst="rect">
+            <a:avLst/>
+          </a:prstGeom>
+        </p:spPr>
+      </p:pic>
+      <p:pic>
+        <p:nvPicPr>
+          <p:cNvPr id="8" name="Picture 7" descr="skd188803sdc.png"/>
+          <p:cNvPicPr>
+            <a:picLocks noChangeAspect="1"/>
+          </p:cNvPicPr>
+          <p:nvPr/>
+        </p:nvPicPr>
+        <p:blipFill rotWithShape="1">
+          <a:blip r:embed="rId4" cstate="print">
+            <a:extLst>
+              <a:ext uri="{28A0092B-C50C-407E-A947-70E740481C1C}">
+                <a14:useLocalDpi xmlns:a14="http://schemas.microsoft.com/office/drawing/2010/main" val="0"/>
+              </a:ext>
+            </a:extLst>
+          </a:blip>
+          <a:srcRect l="57303"/>
+          <a:stretch/>
+        </p:blipFill>
+        <p:spPr>
+          <a:xfrm>
+            <a:off x="4400071" y="2423620"/>
+            <a:ext cx="1484942" cy="2874360"/>
+          </a:xfrm>
+          <a:prstGeom prst="rect">
+            <a:avLst/>
+          </a:prstGeom>
+        </p:spPr>
+      </p:pic>
+      <p:pic>
+        <p:nvPicPr>
+          <p:cNvPr id="9" name="Picture 8" descr="skd188803sdc.png"/>
+          <p:cNvPicPr>
+            <a:picLocks noChangeAspect="1"/>
+          </p:cNvPicPr>
+          <p:nvPr/>
+        </p:nvPicPr>
+        <p:blipFill rotWithShape="1">
+          <a:blip r:embed="rId4" cstate="print">
+            <a:extLst>
+              <a:ext uri="{28A0092B-C50C-407E-A947-70E740481C1C}">
+                <a14:useLocalDpi xmlns:a14="http://schemas.microsoft.com/office/drawing/2010/main" val="0"/>
+              </a:ext>
+            </a:extLst>
+          </a:blip>
+          <a:srcRect l="57303"/>
+          <a:stretch/>
+        </p:blipFill>
+        <p:spPr>
+          <a:xfrm>
+            <a:off x="5142542" y="2423620"/>
+            <a:ext cx="1484942" cy="2874360"/>
+          </a:xfrm>
+          <a:prstGeom prst="rect">
+            <a:avLst/>
+          </a:prstGeom>
+        </p:spPr>
+      </p:pic>
+      <p:cxnSp>
+        <p:nvCxnSpPr>
+          <p:cNvPr id="7" name="Straight Arrow Connector 6"/>
+          <p:cNvCxnSpPr/>
+          <p:nvPr/>
+        </p:nvCxnSpPr>
+        <p:spPr>
+          <a:xfrm>
+            <a:off x="2319867" y="2959576"/>
+            <a:ext cx="1168400" cy="1307624"/>
+          </a:xfrm>
+          <a:prstGeom prst="straightConnector1">
+            <a:avLst/>
+          </a:prstGeom>
+          <a:ln>
+            <a:tailEnd type="arrow"/>
+          </a:ln>
+        </p:spPr>
+        <p:style>
+          <a:lnRef idx="2">
+            <a:schemeClr val="accent1"/>
+          </a:lnRef>
+          <a:fillRef idx="0">
+            <a:schemeClr val="accent1"/>
+          </a:fillRef>
+          <a:effectRef idx="1">
+            <a:schemeClr val="accent1"/>
+          </a:effectRef>
+          <a:fontRef idx="minor">
+            <a:schemeClr val="tx1"/>
+          </a:fontRef>
+        </p:style>
+      </p:cxnSp>
+      <p:cxnSp>
+        <p:nvCxnSpPr>
+          <p:cNvPr id="11" name="Straight Arrow Connector 10"/>
+          <p:cNvCxnSpPr/>
+          <p:nvPr/>
+        </p:nvCxnSpPr>
+        <p:spPr>
+          <a:xfrm>
+            <a:off x="1042988" y="2959576"/>
+            <a:ext cx="2614612" cy="2188157"/>
+          </a:xfrm>
+          <a:prstGeom prst="straightConnector1">
+            <a:avLst/>
+          </a:prstGeom>
+          <a:ln>
+            <a:tailEnd type="arrow"/>
+          </a:ln>
+        </p:spPr>
+        <p:style>
+          <a:lnRef idx="2">
+            <a:schemeClr val="accent1"/>
+          </a:lnRef>
+          <a:fillRef idx="0">
+            <a:schemeClr val="accent1"/>
+          </a:fillRef>
+          <a:effectRef idx="1">
+            <a:schemeClr val="accent1"/>
+          </a:effectRef>
+          <a:fontRef idx="minor">
+            <a:schemeClr val="tx1"/>
+          </a:fontRef>
+        </p:style>
+      </p:cxnSp>
+      <p:cxnSp>
+        <p:nvCxnSpPr>
+          <p:cNvPr id="13" name="Straight Arrow Connector 12"/>
+          <p:cNvCxnSpPr/>
+          <p:nvPr/>
+        </p:nvCxnSpPr>
+        <p:spPr>
+          <a:xfrm flipV="1">
+            <a:off x="6627484" y="2252133"/>
+            <a:ext cx="755449" cy="1896534"/>
+          </a:xfrm>
+          <a:prstGeom prst="straightConnector1">
+            <a:avLst/>
+          </a:prstGeom>
+          <a:ln>
+            <a:tailEnd type="arrow"/>
+          </a:ln>
+        </p:spPr>
+        <p:style>
+          <a:lnRef idx="2">
+            <a:schemeClr val="accent1"/>
+          </a:lnRef>
+          <a:fillRef idx="0">
+            <a:schemeClr val="accent1"/>
+          </a:fillRef>
+          <a:effectRef idx="1">
+            <a:schemeClr val="accent1"/>
+          </a:effectRef>
+          <a:fontRef idx="minor">
+            <a:schemeClr val="tx1"/>
+          </a:fontRef>
+        </p:style>
+      </p:cxnSp>
+      <p:sp>
+        <p:nvSpPr>
+          <p:cNvPr id="17" name="Smiley Face 16"/>
+          <p:cNvSpPr/>
+          <p:nvPr/>
+        </p:nvSpPr>
+        <p:spPr>
+          <a:xfrm>
+            <a:off x="7106920" y="775653"/>
+            <a:ext cx="822960" cy="822960"/>
+          </a:xfrm>
+          <a:prstGeom prst="smileyFace">
+            <a:avLst/>
+          </a:prstGeom>
+          <a:ln/>
+        </p:spPr>
+        <p:style>
+          <a:lnRef idx="1">
+            <a:schemeClr val="accent1"/>
+          </a:lnRef>
+          <a:fillRef idx="3">
+            <a:schemeClr val="accent1"/>
+          </a:fillRef>
+          <a:effectRef idx="2">
+            <a:schemeClr val="accent1"/>
+          </a:effectRef>
+          <a:fontRef idx="minor">
+            <a:schemeClr val="lt1"/>
+          </a:fontRef>
+        </p:style>
+        <p:txBody>
+          <a:bodyPr/>
+          <a:lstStyle/>
+          <a:p>
+            <a:endParaRPr lang="en-US"/>
+          </a:p>
+        </p:txBody>
+      </p:sp>
+      <p:sp>
+        <p:nvSpPr>
+          <p:cNvPr id="16" name="TextBox 15"/>
+          <p:cNvSpPr txBox="1"/>
+          <p:nvPr/>
+        </p:nvSpPr>
+        <p:spPr>
+          <a:xfrm>
+            <a:off x="1981199" y="1977344"/>
+            <a:ext cx="4261897" cy="892552"/>
+          </a:xfrm>
+          <a:prstGeom prst="rect">
+            <a:avLst/>
+          </a:prstGeom>
+          <a:noFill/>
+        </p:spPr>
+        <p:txBody>
+          <a:bodyPr wrap="square" rtlCol="0">
+            <a:spAutoFit/>
+          </a:bodyPr>
+          <a:lstStyle/>
+          <a:p>
+            <a:r>
+              <a:rPr lang="en-US" sz="1600" dirty="0" err="1" smtClean="0">
+                <a:latin typeface="Consolas"/>
+                <a:cs typeface="Consolas"/>
+              </a:rPr>
+              <a:t>ssh</a:t>
+            </a:r>
+            <a:r>
+              <a:rPr lang="en-US" sz="1600" dirty="0" smtClean="0">
+                <a:latin typeface="Consolas"/>
+                <a:cs typeface="Consolas"/>
+              </a:rPr>
+              <a:t> cs61a-??@</a:t>
+            </a:r>
+            <a:r>
+              <a:rPr lang="en-US" sz="1600" dirty="0" err="1" smtClean="0">
+                <a:latin typeface="Consolas"/>
+                <a:cs typeface="Consolas"/>
+              </a:rPr>
+              <a:t>cory.eecs.berkeley.edu</a:t>
+            </a:r>
+            <a:endParaRPr lang="en-US" sz="1600" dirty="0" smtClean="0">
+              <a:latin typeface="Consolas"/>
+              <a:cs typeface="Consolas"/>
+            </a:endParaRPr>
+          </a:p>
+          <a:p>
+            <a:r>
+              <a:rPr lang="en-US" dirty="0" smtClean="0"/>
+              <a:t>connect to remote</a:t>
+            </a:r>
+          </a:p>
+          <a:p>
+            <a:r>
+              <a:rPr lang="en-US" dirty="0" smtClean="0"/>
+              <a:t>terminal</a:t>
+            </a:r>
+            <a:endParaRPr lang="en-US" dirty="0"/>
+          </a:p>
+        </p:txBody>
+      </p:sp>
+      <p:sp>
+        <p:nvSpPr>
+          <p:cNvPr id="22" name="TextBox 21"/>
+          <p:cNvSpPr txBox="1"/>
+          <p:nvPr/>
+        </p:nvSpPr>
+        <p:spPr>
+          <a:xfrm rot="2562708">
+            <a:off x="-714476" y="4187916"/>
+            <a:ext cx="6068685" cy="923330"/>
+          </a:xfrm>
+          <a:prstGeom prst="rect">
+            <a:avLst/>
+          </a:prstGeom>
+          <a:noFill/>
+        </p:spPr>
+        <p:txBody>
+          <a:bodyPr wrap="square" rtlCol="0">
+            <a:spAutoFit/>
+          </a:bodyPr>
+          <a:lstStyle/>
+          <a:p>
+            <a:r>
+              <a:rPr lang="en-US" dirty="0" err="1">
+                <a:latin typeface="Consolas"/>
+                <a:cs typeface="Consolas"/>
+              </a:rPr>
+              <a:t>s</a:t>
+            </a:r>
+            <a:r>
+              <a:rPr lang="en-US" dirty="0" err="1" smtClean="0">
+                <a:latin typeface="Consolas"/>
+                <a:cs typeface="Consolas"/>
+              </a:rPr>
+              <a:t>cp</a:t>
+            </a:r>
+            <a:r>
+              <a:rPr lang="en-US" dirty="0" smtClean="0">
+                <a:latin typeface="Consolas"/>
+                <a:cs typeface="Consolas"/>
+              </a:rPr>
+              <a:t> ~/path/to/</a:t>
+            </a:r>
+            <a:r>
+              <a:rPr lang="en-US" dirty="0" err="1" smtClean="0">
+                <a:latin typeface="Consolas"/>
+                <a:cs typeface="Consolas"/>
+              </a:rPr>
+              <a:t>file.py</a:t>
+            </a:r>
+            <a:r>
+              <a:rPr lang="en-US" dirty="0" smtClean="0">
+                <a:latin typeface="Consolas"/>
+                <a:cs typeface="Consolas"/>
+              </a:rPr>
+              <a:t> </a:t>
+            </a:r>
+          </a:p>
+          <a:p>
+            <a:r>
+              <a:rPr lang="en-US" dirty="0" smtClean="0">
+                <a:latin typeface="Consolas"/>
+                <a:cs typeface="Consolas"/>
+              </a:rPr>
+              <a:t>cs61a-??@</a:t>
+            </a:r>
+            <a:r>
+              <a:rPr lang="en-US" dirty="0" err="1" smtClean="0">
+                <a:latin typeface="Consolas"/>
+                <a:cs typeface="Consolas"/>
+              </a:rPr>
+              <a:t>cory.eecs.berkeley.edu</a:t>
+            </a:r>
+            <a:r>
+              <a:rPr lang="en-US" dirty="0" smtClean="0">
+                <a:latin typeface="Consolas"/>
+                <a:cs typeface="Consolas"/>
+              </a:rPr>
+              <a:t>:~/</a:t>
+            </a:r>
+            <a:r>
+              <a:rPr lang="en-US" dirty="0" err="1" smtClean="0">
+                <a:latin typeface="Consolas"/>
+                <a:cs typeface="Consolas"/>
+              </a:rPr>
+              <a:t>dest</a:t>
+            </a:r>
+            <a:r>
+              <a:rPr lang="en-US" dirty="0">
+                <a:latin typeface="Consolas"/>
+                <a:cs typeface="Consolas"/>
+              </a:rPr>
+              <a:t>/</a:t>
+            </a:r>
+            <a:r>
+              <a:rPr lang="en-US" dirty="0" smtClean="0">
+                <a:latin typeface="Consolas"/>
+                <a:cs typeface="Consolas"/>
+              </a:rPr>
+              <a:t>folder</a:t>
+            </a:r>
+          </a:p>
+          <a:p>
+            <a:r>
+              <a:rPr lang="en-US" dirty="0" smtClean="0"/>
+              <a:t>Copy file to remote server</a:t>
+            </a:r>
+            <a:endParaRPr lang="en-US" dirty="0"/>
+          </a:p>
+        </p:txBody>
+      </p:sp>
+      <p:sp>
+        <p:nvSpPr>
+          <p:cNvPr id="23" name="TextBox 22"/>
+          <p:cNvSpPr txBox="1"/>
+          <p:nvPr/>
+        </p:nvSpPr>
+        <p:spPr>
+          <a:xfrm>
+            <a:off x="6581764" y="1850813"/>
+            <a:ext cx="2267595" cy="3693319"/>
+          </a:xfrm>
+          <a:prstGeom prst="rect">
+            <a:avLst/>
+          </a:prstGeom>
+          <a:noFill/>
+        </p:spPr>
+        <p:txBody>
+          <a:bodyPr wrap="square" rtlCol="0">
+            <a:spAutoFit/>
+          </a:bodyPr>
+          <a:lstStyle/>
+          <a:p>
+            <a:r>
+              <a:rPr lang="en-US" dirty="0" smtClean="0">
+                <a:latin typeface="Consolas"/>
+                <a:cs typeface="Consolas"/>
+              </a:rPr>
+              <a:t>submit lab01</a:t>
+            </a:r>
+          </a:p>
+          <a:p>
+            <a:endParaRPr lang="en-US" dirty="0"/>
+          </a:p>
+          <a:p>
+            <a:r>
+              <a:rPr lang="en-US" dirty="0" smtClean="0"/>
+              <a:t>Actually give your files to us!</a:t>
+            </a:r>
+          </a:p>
+          <a:p>
+            <a:pPr marL="285750" indent="-285750">
+              <a:buFontTx/>
+              <a:buChar char="-"/>
+            </a:pPr>
+            <a:r>
+              <a:rPr lang="en-US" dirty="0" smtClean="0"/>
+              <a:t>Make sure you are in the right folder</a:t>
+            </a:r>
+          </a:p>
+          <a:p>
+            <a:pPr marL="285750" indent="-285750">
+              <a:buFontTx/>
+              <a:buChar char="-"/>
+            </a:pPr>
+            <a:r>
+              <a:rPr lang="en-US" dirty="0" smtClean="0"/>
+              <a:t>Do not include .</a:t>
+            </a:r>
+            <a:r>
+              <a:rPr lang="en-US" dirty="0" err="1" smtClean="0"/>
+              <a:t>py</a:t>
+            </a:r>
+            <a:r>
+              <a:rPr lang="en-US" dirty="0" smtClean="0"/>
+              <a:t> ending here</a:t>
+            </a:r>
+          </a:p>
+          <a:p>
+            <a:pPr marL="285750" indent="-285750">
+              <a:buFontTx/>
+              <a:buChar char="-"/>
+            </a:pPr>
+            <a:r>
+              <a:rPr lang="en-US" dirty="0" smtClean="0"/>
+              <a:t>Do not submit from ~ folder</a:t>
+            </a:r>
+          </a:p>
+          <a:p>
+            <a:pPr marL="285750" indent="-285750">
+              <a:buFontTx/>
+              <a:buChar char="-"/>
+            </a:pPr>
+            <a:endParaRPr lang="en-US" dirty="0" smtClean="0"/>
+          </a:p>
+        </p:txBody>
+      </p:sp>
+      <p:sp>
+        <p:nvSpPr>
+          <p:cNvPr id="24" name="TextBox 23"/>
+          <p:cNvSpPr txBox="1"/>
+          <p:nvPr/>
+        </p:nvSpPr>
+        <p:spPr>
+          <a:xfrm>
+            <a:off x="5032364" y="5297980"/>
+            <a:ext cx="3098800" cy="1477328"/>
+          </a:xfrm>
+          <a:prstGeom prst="rect">
+            <a:avLst/>
+          </a:prstGeom>
+          <a:noFill/>
+        </p:spPr>
+        <p:txBody>
+          <a:bodyPr wrap="square" rtlCol="0">
+            <a:spAutoFit/>
+          </a:bodyPr>
+          <a:lstStyle/>
+          <a:p>
+            <a:r>
+              <a:rPr lang="en-US" dirty="0" err="1">
+                <a:latin typeface="Consolas"/>
+                <a:cs typeface="Consolas"/>
+              </a:rPr>
+              <a:t>c</a:t>
+            </a:r>
+            <a:r>
+              <a:rPr lang="en-US" dirty="0" err="1" smtClean="0">
+                <a:latin typeface="Consolas"/>
+                <a:cs typeface="Consolas"/>
+              </a:rPr>
+              <a:t>ory</a:t>
+            </a:r>
+            <a:r>
+              <a:rPr lang="en-US" dirty="0" smtClean="0">
+                <a:latin typeface="Consolas"/>
+                <a:cs typeface="Consolas"/>
+              </a:rPr>
+              <a:t>[2] ~ #</a:t>
+            </a:r>
+          </a:p>
+          <a:p>
+            <a:r>
+              <a:rPr lang="en-US" dirty="0" smtClean="0"/>
+              <a:t>Your prompt should now say that you are in Berkeley’s server! UNIX is used here!!!</a:t>
+            </a:r>
+            <a:endParaRPr lang="en-US" dirty="0"/>
+          </a:p>
+        </p:txBody>
+      </p:sp>
+    </p:spTree>
+    <p:extLst>
+      <p:ext uri="{BB962C8B-B14F-4D97-AF65-F5344CB8AC3E}">
+        <p14:creationId xmlns:p14="http://schemas.microsoft.com/office/powerpoint/2010/main" val="1046204909"/>
+      </p:ext>
+    </p:extLst>
+  </p:cSld>
+  <p:clrMapOvr>
+    <a:masterClrMapping/>
+  </p:clrMapOvr>
+  <p:timing>
+    <p:tnLst>
+      <p:par>
+        <p:cTn xmlns:p14="http://schemas.microsoft.com/office/powerpoint/2010/main" id="1" dur="indefinite" restart="never" nodeType="tmRoot"/>
+      </p:par>
+    </p:tnLst>
+  </p:timing>
+</p:sld>
+</file>
+
+<file path=ppt/slides/slide7.xml><?xml version="1.0" encoding="utf-8"?>
+<p:sld xmlns:a="http://schemas.openxmlformats.org/drawingml/2006/main" xmlns:r="http://schemas.openxmlformats.org/officeDocument/2006/relationships" xmlns:p="http://schemas.openxmlformats.org/presentationml/2006/main">
+  <p:cSld>
+    <p:spTree>
+      <p:nvGrpSpPr>
+        <p:cNvPr id="1" name=""/>
+        <p:cNvGrpSpPr/>
+        <p:nvPr/>
+      </p:nvGrpSpPr>
+      <p:grpSpPr>
+        <a:xfrm>
+          <a:off x="0" y="0"/>
+          <a:ext cx="0" cy="0"/>
+          <a:chOff x="0" y="0"/>
+          <a:chExt cx="0" cy="0"/>
+        </a:xfrm>
+      </p:grpSpPr>
+      <p:sp>
+        <p:nvSpPr>
+          <p:cNvPr id="6145" name="Title 1"/>
+          <p:cNvSpPr>
+            <a:spLocks noGrp="1"/>
+          </p:cNvSpPr>
+          <p:nvPr>
+            <p:ph type="title"/>
+          </p:nvPr>
+        </p:nvSpPr>
+        <p:spPr>
+          <a:xfrm>
+            <a:off x="1042988" y="455613"/>
+            <a:ext cx="7024687" cy="1143000"/>
+          </a:xfrm>
+        </p:spPr>
+        <p:txBody>
+          <a:bodyPr/>
+          <a:lstStyle/>
+          <a:p>
+            <a:r>
+              <a:rPr lang="en-US" dirty="0" smtClean="0">
+                <a:latin typeface="Century Gothic" charset="0"/>
+              </a:rPr>
+              <a:t>To get to my website</a:t>
+            </a:r>
+            <a:endParaRPr lang="en-US" dirty="0">
+              <a:latin typeface="Century Gothic" charset="0"/>
+            </a:endParaRPr>
+          </a:p>
+        </p:txBody>
+      </p:sp>
+      <p:sp>
+        <p:nvSpPr>
+          <p:cNvPr id="3" name="Content Placeholder 2"/>
+          <p:cNvSpPr>
+            <a:spLocks noGrp="1"/>
+          </p:cNvSpPr>
+          <p:nvPr>
+            <p:ph idx="1"/>
+          </p:nvPr>
+        </p:nvSpPr>
+        <p:spPr>
+          <a:xfrm>
+            <a:off x="457199" y="1598613"/>
+            <a:ext cx="8314267" cy="4903787"/>
+          </a:xfrm>
+        </p:spPr>
+        <p:txBody>
+          <a:bodyPr/>
+          <a:lstStyle/>
+          <a:p>
+            <a:r>
+              <a:rPr lang="en-US" dirty="0" err="1" smtClean="0">
+                <a:solidFill>
+                  <a:srgbClr val="4A6300"/>
+                </a:solidFill>
+                <a:latin typeface="Avenir Book"/>
+                <a:cs typeface="Avenir Book"/>
+              </a:rPr>
+              <a:t>dicksontsai.com</a:t>
+            </a:r>
+            <a:r>
+              <a:rPr lang="en-US" dirty="0" smtClean="0">
+                <a:solidFill>
+                  <a:srgbClr val="4A6300"/>
+                </a:solidFill>
+                <a:latin typeface="Avenir Book"/>
+                <a:cs typeface="Avenir Book"/>
+              </a:rPr>
+              <a:t>/cs61a</a:t>
+            </a:r>
+          </a:p>
+          <a:p>
+            <a:r>
+              <a:rPr lang="en-US" dirty="0" smtClean="0">
+                <a:solidFill>
+                  <a:srgbClr val="4A6300"/>
+                </a:solidFill>
+                <a:latin typeface="Avenir Book"/>
+                <a:cs typeface="Avenir Book"/>
+              </a:rPr>
+              <a:t>OR</a:t>
+            </a:r>
+          </a:p>
+          <a:p>
+            <a:pPr lvl="1"/>
+            <a:r>
+              <a:rPr lang="en-US" dirty="0" smtClean="0">
+                <a:solidFill>
+                  <a:srgbClr val="4A6300"/>
+                </a:solidFill>
+                <a:latin typeface="Avenir Book"/>
+                <a:cs typeface="Avenir Book"/>
+              </a:rPr>
+              <a:t>Go to cs61a.org</a:t>
+            </a:r>
+          </a:p>
+          <a:p>
+            <a:pPr lvl="1"/>
+            <a:r>
+              <a:rPr lang="en-US" dirty="0" smtClean="0">
+                <a:solidFill>
+                  <a:srgbClr val="4A6300"/>
+                </a:solidFill>
+                <a:latin typeface="Avenir Book"/>
+                <a:cs typeface="Avenir Book"/>
+              </a:rPr>
+              <a:t>Click the “Staff” link</a:t>
+            </a:r>
+          </a:p>
+          <a:p>
+            <a:pPr lvl="1"/>
+            <a:r>
+              <a:rPr lang="en-US" dirty="0" smtClean="0">
+                <a:solidFill>
+                  <a:srgbClr val="4A6300"/>
+                </a:solidFill>
+                <a:latin typeface="Avenir Book"/>
+                <a:cs typeface="Avenir Book"/>
+              </a:rPr>
+              <a:t>Click my name</a:t>
+            </a:r>
+          </a:p>
+          <a:p>
+            <a:pPr lvl="1"/>
+            <a:r>
+              <a:rPr lang="en-US" dirty="0" smtClean="0">
+                <a:solidFill>
+                  <a:srgbClr val="4A6300"/>
+                </a:solidFill>
+                <a:latin typeface="Avenir Book"/>
+                <a:cs typeface="Avenir Book"/>
+              </a:rPr>
+              <a:t>Go to Discussion for discussion materials</a:t>
+            </a:r>
+          </a:p>
+          <a:p>
+            <a:pPr lvl="1"/>
+            <a:endParaRPr lang="en-US" dirty="0">
+              <a:solidFill>
+                <a:srgbClr val="4A6300"/>
+              </a:solidFill>
+              <a:latin typeface="Avenir Book"/>
+              <a:cs typeface="Avenir Book"/>
+            </a:endParaRPr>
+          </a:p>
+          <a:p>
+            <a:r>
+              <a:rPr lang="en-US" dirty="0" smtClean="0">
+                <a:solidFill>
+                  <a:srgbClr val="4A6300"/>
+                </a:solidFill>
+                <a:latin typeface="Avenir Book"/>
+                <a:cs typeface="Avenir Book"/>
+              </a:rPr>
+              <a:t>You will find my slides to discussion/lab. They may be different, because I add more content along the day. </a:t>
+            </a:r>
+          </a:p>
+        </p:txBody>
+      </p:sp>
+      <p:sp>
+        <p:nvSpPr>
+          <p:cNvPr id="6147" name="Slide Number Placeholder 4"/>
+          <p:cNvSpPr>
+            <a:spLocks noGrp="1"/>
+          </p:cNvSpPr>
+          <p:nvPr>
+            <p:ph type="sldNum" sz="quarter" idx="12"/>
+          </p:nvPr>
+        </p:nvSpPr>
+        <p:spPr bwMode="auto">
+          <a:noFill/>
+          <a:extLst>
+            <a:ext uri="{909E8E84-426E-40dd-AFC4-6F175D3DCCD1}">
+              <a14:hiddenFill xmlns:a14="http://schemas.microsoft.com/office/drawing/2010/main">
+                <a:solidFill>
+                  <a:srgbClr val="FFFFFF"/>
+                </a:solidFill>
+              </a14:hiddenFill>
+            </a:ext>
+            <a:ext uri="{91240B29-F687-4f45-9708-019B960494DF}">
+              <a14:hiddenLine xmlns:a14="http://schemas.microsoft.com/office/drawing/2010/main" w="9525">
+                <a:solidFill>
+                  <a:srgbClr val="000000"/>
+                </a:solidFill>
+                <a:miter lim="800000"/>
+                <a:headEnd/>
+                <a:tailEnd/>
+              </a14:hiddenLine>
+            </a:ext>
+          </a:extLst>
+        </p:spPr>
+        <p:txBody>
+          <a:bodyPr wrap="square" numCol="1" anchorCtr="0" compatLnSpc="1">
+            <a:prstTxWarp prst="textNoShape">
+              <a:avLst/>
+            </a:prstTxWarp>
+          </a:bodyPr>
+          <a:lstStyle>
+            <a:lvl1pPr>
+              <a:defRPr>
+                <a:solidFill>
+                  <a:schemeClr val="tx1"/>
+                </a:solidFill>
+                <a:latin typeface="Century Gothic" charset="0"/>
+                <a:ea typeface="ＭＳ Ｐゴシック" charset="0"/>
+                <a:cs typeface="ＭＳ Ｐゴシック" charset="0"/>
+              </a:defRPr>
+            </a:lvl1pPr>
+            <a:lvl2pPr marL="742950" indent="-285750">
+              <a:defRPr>
+                <a:solidFill>
+                  <a:schemeClr val="tx1"/>
+                </a:solidFill>
+                <a:latin typeface="Century Gothic" charset="0"/>
+                <a:ea typeface="ＭＳ Ｐゴシック" charset="0"/>
+              </a:defRPr>
+            </a:lvl2pPr>
+            <a:lvl3pPr marL="1143000" indent="-228600">
+              <a:defRPr>
+                <a:solidFill>
+                  <a:schemeClr val="tx1"/>
+                </a:solidFill>
+                <a:latin typeface="Century Gothic" charset="0"/>
+                <a:ea typeface="ＭＳ Ｐゴシック" charset="0"/>
+              </a:defRPr>
+            </a:lvl3pPr>
+            <a:lvl4pPr marL="1600200" indent="-228600">
+              <a:defRPr>
+                <a:solidFill>
+                  <a:schemeClr val="tx1"/>
+                </a:solidFill>
+                <a:latin typeface="Century Gothic" charset="0"/>
+                <a:ea typeface="ＭＳ Ｐゴシック" charset="0"/>
+              </a:defRPr>
+            </a:lvl4pPr>
+            <a:lvl5pPr marL="2057400" indent="-228600">
+              <a:defRPr>
+                <a:solidFill>
+                  <a:schemeClr val="tx1"/>
+                </a:solidFill>
+                <a:latin typeface="Century Gothic" charset="0"/>
+                <a:ea typeface="ＭＳ Ｐゴシック" charset="0"/>
+              </a:defRPr>
+            </a:lvl5pPr>
+            <a:lvl6pPr marL="2514600" indent="-228600" fontAlgn="base">
+              <a:spcBef>
+                <a:spcPct val="0"/>
+              </a:spcBef>
+              <a:spcAft>
+                <a:spcPct val="0"/>
+              </a:spcAft>
+              <a:defRPr>
+                <a:solidFill>
+                  <a:schemeClr val="tx1"/>
+                </a:solidFill>
+                <a:latin typeface="Century Gothic" charset="0"/>
+                <a:ea typeface="ＭＳ Ｐゴシック" charset="0"/>
+              </a:defRPr>
+            </a:lvl6pPr>
+            <a:lvl7pPr marL="2971800" indent="-228600" fontAlgn="base">
+              <a:spcBef>
+                <a:spcPct val="0"/>
+              </a:spcBef>
+              <a:spcAft>
+                <a:spcPct val="0"/>
+              </a:spcAft>
+              <a:defRPr>
+                <a:solidFill>
+                  <a:schemeClr val="tx1"/>
+                </a:solidFill>
+                <a:latin typeface="Century Gothic" charset="0"/>
+                <a:ea typeface="ＭＳ Ｐゴシック" charset="0"/>
+              </a:defRPr>
+            </a:lvl7pPr>
+            <a:lvl8pPr marL="3429000" indent="-228600" fontAlgn="base">
+              <a:spcBef>
+                <a:spcPct val="0"/>
+              </a:spcBef>
+              <a:spcAft>
+                <a:spcPct val="0"/>
+              </a:spcAft>
+              <a:defRPr>
+                <a:solidFill>
+                  <a:schemeClr val="tx1"/>
+                </a:solidFill>
+                <a:latin typeface="Century Gothic" charset="0"/>
+                <a:ea typeface="ＭＳ Ｐゴシック" charset="0"/>
+              </a:defRPr>
+            </a:lvl8pPr>
+            <a:lvl9pPr marL="3886200" indent="-228600" fontAlgn="base">
+              <a:spcBef>
+                <a:spcPct val="0"/>
+              </a:spcBef>
+              <a:spcAft>
+                <a:spcPct val="0"/>
+              </a:spcAft>
+              <a:defRPr>
+                <a:solidFill>
+                  <a:schemeClr val="tx1"/>
+                </a:solidFill>
+                <a:latin typeface="Century Gothic" charset="0"/>
+                <a:ea typeface="ＭＳ Ｐゴシック" charset="0"/>
+              </a:defRPr>
+            </a:lvl9pPr>
+          </a:lstStyle>
+          <a:p>
+            <a:pPr fontAlgn="base">
+              <a:spcBef>
+                <a:spcPct val="0"/>
+              </a:spcBef>
+              <a:spcAft>
+                <a:spcPct val="0"/>
+              </a:spcAft>
+            </a:pPr>
+            <a:fld id="{9B6F7E0B-2963-1842-872C-CA99E62BCD77}" type="slidenum">
+              <a:rPr lang="en-US">
+                <a:solidFill>
+                  <a:srgbClr val="FEFEFE"/>
+                </a:solidFill>
+              </a:rPr>
+              <a:pPr fontAlgn="base">
+                <a:spcBef>
+                  <a:spcPct val="0"/>
+                </a:spcBef>
+                <a:spcAft>
+                  <a:spcPct val="0"/>
+                </a:spcAft>
+              </a:pPr>
+              <a:t>7</a:t>
+            </a:fld>
+            <a:endParaRPr lang="en-US">
+              <a:solidFill>
+                <a:srgbClr val="FEFEFE"/>
+              </a:solidFill>
+            </a:endParaRPr>
+          </a:p>
+        </p:txBody>
+      </p:sp>
+    </p:spTree>
+    <p:extLst>
+      <p:ext uri="{BB962C8B-B14F-4D97-AF65-F5344CB8AC3E}">
+        <p14:creationId xmlns:p14="http://schemas.microsoft.com/office/powerpoint/2010/main" val="3708786442"/>
+      </p:ext>
+    </p:extLst>
+  </p:cSld>
+  <p:clrMapOvr>
+    <a:masterClrMapping/>
+  </p:clrMapOvr>
+  <p:timing>
+    <p:tnLst>
+      <p:par>
+        <p:cTn xmlns:p14="http://schemas.microsoft.com/office/powerpoint/2010/main" id="1" dur="indefinite" restart="never" nodeType="tmRoot">
+          <p:childTnLst>
+            <p:seq concurrent="1" nextAc="seek">
+              <p:cTn id="2" dur="indefinite" nodeType="mainSeq">
+                <p:childTnLst>
+                  <p:par>
+                    <p:cTn id="3" fill="hold" nodeType="clickPar">
+                      <p:stCondLst>
+                        <p:cond delay="indefinite"/>
+                      </p:stCondLst>
+                      <p:childTnLst>
+                        <p:par>
+                          <p:cTn id="4" fill="hold" nodeType="withGroup">
+                            <p:stCondLst>
+                              <p:cond delay="0"/>
+                            </p:stCondLst>
+                            <p:childTnLst>
+                              <p:par>
+                                <p:cTn id="5" presetID="2" presetClass="entr" presetSubtype="4" fill="hold" grpId="0" nodeType="clickEffect">
+                                  <p:stCondLst>
+                                    <p:cond delay="0"/>
+                                  </p:stCondLst>
+                                  <p:childTnLst>
+                                    <p:set>
+                                      <p:cBhvr>
+                                        <p:cTn id="6" dur="1" fill="hold">
+                                          <p:stCondLst>
+                                            <p:cond delay="0"/>
+                                          </p:stCondLst>
+                                        </p:cTn>
+                                        <p:tgtEl>
+                                          <p:spTgt spid="3">
+                                            <p:txEl>
+                                              <p:pRg st="0" end="0"/>
+                                            </p:txEl>
+                                          </p:spTgt>
+                                        </p:tgtEl>
+                                        <p:attrNameLst>
+                                          <p:attrName>style.visibility</p:attrName>
+                                        </p:attrNameLst>
+                                      </p:cBhvr>
+                                      <p:to>
+                                        <p:strVal val="visible"/>
+                                      </p:to>
+                                    </p:set>
+                                    <p:anim calcmode="lin" valueType="num">
+                                      <p:cBhvr additive="base">
+                                        <p:cTn id="7" dur="500" fill="hold"/>
+                                        <p:tgtEl>
+                                          <p:spTgt spid="3">
+                                            <p:txEl>
+                                              <p:pRg st="0" end="0"/>
+                                            </p:txEl>
+                                          </p:spTgt>
+                                        </p:tgtEl>
+                                        <p:attrNameLst>
+                                          <p:attrName>ppt_x</p:attrName>
+                                        </p:attrNameLst>
+                                      </p:cBhvr>
+                                      <p:tavLst>
+                                        <p:tav tm="0">
+                                          <p:val>
+                                            <p:strVal val="#ppt_x"/>
+                                          </p:val>
+                                        </p:tav>
+                                        <p:tav tm="100000">
+                                          <p:val>
+                                            <p:strVal val="#ppt_x"/>
+                                          </p:val>
+                                        </p:tav>
+                                      </p:tavLst>
+                                    </p:anim>
+                                    <p:anim calcmode="lin" valueType="num">
+                                      <p:cBhvr additive="base">
+                                        <p:cTn id="8" dur="500" fill="hold"/>
+                                        <p:tgtEl>
+                                          <p:spTgt spid="3">
+                                            <p:txEl>
+                                              <p:pRg st="0" end="0"/>
+                                            </p:txEl>
+                                          </p:spTgt>
+                                        </p:tgtEl>
+                                        <p:attrNameLst>
+                                          <p:attrName>ppt_y</p:attrName>
+                                        </p:attrNameLst>
+                                      </p:cBhvr>
+                                      <p:tavLst>
+                                        <p:tav tm="0">
+                                          <p:val>
+                                            <p:strVal val="1+#ppt_h/2"/>
+                                          </p:val>
+                                        </p:tav>
+                                        <p:tav tm="100000">
+                                          <p:val>
+                                            <p:strVal val="#ppt_y"/>
+                                          </p:val>
+                                        </p:tav>
+                                      </p:tavLst>
+                                    </p:anim>
+                                  </p:childTnLst>
+                                </p:cTn>
+                              </p:par>
+                            </p:childTnLst>
+                          </p:cTn>
+                        </p:par>
+                      </p:childTnLst>
+                    </p:cTn>
+                  </p:par>
+                  <p:par>
+                    <p:cTn id="9" fill="hold">
+                      <p:stCondLst>
+                        <p:cond delay="indefinite"/>
+                      </p:stCondLst>
+                      <p:childTnLst>
+                        <p:par>
+                          <p:cTn id="10" fill="hold">
+                            <p:stCondLst>
+                              <p:cond delay="0"/>
+                            </p:stCondLst>
+                            <p:childTnLst>
+                              <p:par>
+                                <p:cTn id="11" presetID="2" presetClass="entr" presetSubtype="4" fill="hold" grpId="0" nodeType="clickEffect">
+                                  <p:stCondLst>
+                                    <p:cond delay="0"/>
+                                  </p:stCondLst>
+                                  <p:childTnLst>
+                                    <p:set>
+                                      <p:cBhvr>
+                                        <p:cTn id="12" dur="1" fill="hold">
+                                          <p:stCondLst>
+                                            <p:cond delay="0"/>
+                                          </p:stCondLst>
+                                        </p:cTn>
+                                        <p:tgtEl>
+                                          <p:spTgt spid="3">
+                                            <p:txEl>
+                                              <p:pRg st="1" end="1"/>
+                                            </p:txEl>
+                                          </p:spTgt>
+                                        </p:tgtEl>
+                                        <p:attrNameLst>
+                                          <p:attrName>style.visibility</p:attrName>
+                                        </p:attrNameLst>
+                                      </p:cBhvr>
+                                      <p:to>
+                                        <p:strVal val="visible"/>
+                                      </p:to>
+                                    </p:set>
+                                    <p:anim calcmode="lin" valueType="num">
+                                      <p:cBhvr additive="base">
+                                        <p:cTn id="13" dur="500" fill="hold"/>
+                                        <p:tgtEl>
+                                          <p:spTgt spid="3">
+                                            <p:txEl>
+                                              <p:pRg st="1" end="1"/>
+                                            </p:txEl>
+                                          </p:spTgt>
+                                        </p:tgtEl>
+                                        <p:attrNameLst>
+                                          <p:attrName>ppt_x</p:attrName>
+                                        </p:attrNameLst>
+                                      </p:cBhvr>
+                                      <p:tavLst>
+                                        <p:tav tm="0">
+                                          <p:val>
+                                            <p:strVal val="#ppt_x"/>
+                                          </p:val>
+                                        </p:tav>
+                                        <p:tav tm="100000">
+                                          <p:val>
+                                            <p:strVal val="#ppt_x"/>
+                                          </p:val>
+                                        </p:tav>
+                                      </p:tavLst>
+                                    </p:anim>
+                                    <p:anim calcmode="lin" valueType="num">
+                                      <p:cBhvr additive="base">
+                                        <p:cTn id="14" dur="500" fill="hold"/>
+                                        <p:tgtEl>
+                                          <p:spTgt spid="3">
+                                            <p:txEl>
+                                              <p:pRg st="1" end="1"/>
+                                            </p:txEl>
+                                          </p:spTgt>
+                                        </p:tgtEl>
+                                        <p:attrNameLst>
+                                          <p:attrName>ppt_y</p:attrName>
+                                        </p:attrNameLst>
+                                      </p:cBhvr>
+                                      <p:tavLst>
+                                        <p:tav tm="0">
+                                          <p:val>
+                                            <p:strVal val="1+#ppt_h/2"/>
+                                          </p:val>
+                                        </p:tav>
+                                        <p:tav tm="100000">
+                                          <p:val>
+                                            <p:strVal val="#ppt_y"/>
+                                          </p:val>
+                                        </p:tav>
+                                      </p:tavLst>
+                                    </p:anim>
+                                  </p:childTnLst>
+                                </p:cTn>
+                              </p:par>
+                              <p:par>
+                                <p:cTn id="15" presetID="2" presetClass="entr" presetSubtype="4" fill="hold" grpId="0" nodeType="withEffect">
+                                  <p:stCondLst>
+                                    <p:cond delay="0"/>
+                                  </p:stCondLst>
+                                  <p:childTnLst>
+                                    <p:set>
+                                      <p:cBhvr>
+                                        <p:cTn id="16" dur="1" fill="hold">
+                                          <p:stCondLst>
+                                            <p:cond delay="0"/>
+                                          </p:stCondLst>
+                                        </p:cTn>
+                                        <p:tgtEl>
+                                          <p:spTgt spid="3">
+                                            <p:txEl>
+                                              <p:pRg st="2" end="2"/>
+                                            </p:txEl>
+                                          </p:spTgt>
+                                        </p:tgtEl>
+                                        <p:attrNameLst>
+                                          <p:attrName>style.visibility</p:attrName>
+                                        </p:attrNameLst>
+                                      </p:cBhvr>
+                                      <p:to>
+                                        <p:strVal val="visible"/>
+                                      </p:to>
+                                    </p:set>
+                                    <p:anim calcmode="lin" valueType="num">
+                                      <p:cBhvr additive="base">
+                                        <p:cTn id="17" dur="500" fill="hold"/>
+                                        <p:tgtEl>
+                                          <p:spTgt spid="3">
+                                            <p:txEl>
+                                              <p:pRg st="2" end="2"/>
+                                            </p:txEl>
+                                          </p:spTgt>
+                                        </p:tgtEl>
+                                        <p:attrNameLst>
+                                          <p:attrName>ppt_x</p:attrName>
+                                        </p:attrNameLst>
+                                      </p:cBhvr>
+                                      <p:tavLst>
+                                        <p:tav tm="0">
+                                          <p:val>
+                                            <p:strVal val="#ppt_x"/>
+                                          </p:val>
+                                        </p:tav>
+                                        <p:tav tm="100000">
+                                          <p:val>
+                                            <p:strVal val="#ppt_x"/>
+                                          </p:val>
+                                        </p:tav>
+                                      </p:tavLst>
+                                    </p:anim>
+                                    <p:anim calcmode="lin" valueType="num">
+                                      <p:cBhvr additive="base">
+                                        <p:cTn id="18" dur="500" fill="hold"/>
+                                        <p:tgtEl>
+                                          <p:spTgt spid="3">
+                                            <p:txEl>
+                                              <p:pRg st="2" end="2"/>
+                                            </p:txEl>
+                                          </p:spTgt>
+                                        </p:tgtEl>
+                                        <p:attrNameLst>
+                                          <p:attrName>ppt_y</p:attrName>
+                                        </p:attrNameLst>
+                                      </p:cBhvr>
+                                      <p:tavLst>
+                                        <p:tav tm="0">
+                                          <p:val>
+                                            <p:strVal val="1+#ppt_h/2"/>
+                                          </p:val>
+                                        </p:tav>
+                                        <p:tav tm="100000">
+                                          <p:val>
+                                            <p:strVal val="#ppt_y"/>
+                                          </p:val>
+                                        </p:tav>
+                                      </p:tavLst>
+                                    </p:anim>
+                                  </p:childTnLst>
+                                </p:cTn>
+                              </p:par>
+                              <p:par>
+                                <p:cTn id="19" presetID="2" presetClass="entr" presetSubtype="4" fill="hold" grpId="0" nodeType="withEffect">
+                                  <p:stCondLst>
+                                    <p:cond delay="0"/>
+                                  </p:stCondLst>
+                                  <p:childTnLst>
+                                    <p:set>
+                                      <p:cBhvr>
+                                        <p:cTn id="20" dur="1" fill="hold">
+                                          <p:stCondLst>
+                                            <p:cond delay="0"/>
+                                          </p:stCondLst>
+                                        </p:cTn>
+                                        <p:tgtEl>
+                                          <p:spTgt spid="3">
+                                            <p:txEl>
+                                              <p:pRg st="3" end="3"/>
+                                            </p:txEl>
+                                          </p:spTgt>
+                                        </p:tgtEl>
+                                        <p:attrNameLst>
+                                          <p:attrName>style.visibility</p:attrName>
+                                        </p:attrNameLst>
+                                      </p:cBhvr>
+                                      <p:to>
+                                        <p:strVal val="visible"/>
+                                      </p:to>
+                                    </p:set>
+                                    <p:anim calcmode="lin" valueType="num">
+                                      <p:cBhvr additive="base">
+                                        <p:cTn id="21" dur="500" fill="hold"/>
+                                        <p:tgtEl>
+                                          <p:spTgt spid="3">
+                                            <p:txEl>
+                                              <p:pRg st="3" end="3"/>
+                                            </p:txEl>
+                                          </p:spTgt>
+                                        </p:tgtEl>
+                                        <p:attrNameLst>
+                                          <p:attrName>ppt_x</p:attrName>
+                                        </p:attrNameLst>
+                                      </p:cBhvr>
+                                      <p:tavLst>
+                                        <p:tav tm="0">
+                                          <p:val>
+                                            <p:strVal val="#ppt_x"/>
+                                          </p:val>
+                                        </p:tav>
+                                        <p:tav tm="100000">
+                                          <p:val>
+                                            <p:strVal val="#ppt_x"/>
+                                          </p:val>
+                                        </p:tav>
+                                      </p:tavLst>
+                                    </p:anim>
+                                    <p:anim calcmode="lin" valueType="num">
+                                      <p:cBhvr additive="base">
+                                        <p:cTn id="22" dur="500" fill="hold"/>
+                                        <p:tgtEl>
+                                          <p:spTgt spid="3">
+                                            <p:txEl>
+                                              <p:pRg st="3" end="3"/>
+                                            </p:txEl>
+                                          </p:spTgt>
+                                        </p:tgtEl>
+                                        <p:attrNameLst>
+                                          <p:attrName>ppt_y</p:attrName>
+                                        </p:attrNameLst>
+                                      </p:cBhvr>
+                                      <p:tavLst>
+                                        <p:tav tm="0">
+                                          <p:val>
+                                            <p:strVal val="1+#ppt_h/2"/>
+                                          </p:val>
+                                        </p:tav>
+                                        <p:tav tm="100000">
+                                          <p:val>
+                                            <p:strVal val="#ppt_y"/>
+                                          </p:val>
+                                        </p:tav>
+                                      </p:tavLst>
+                                    </p:anim>
+                                  </p:childTnLst>
+                                </p:cTn>
+                              </p:par>
+                              <p:par>
+                                <p:cTn id="23" presetID="2" presetClass="entr" presetSubtype="4" fill="hold" grpId="0" nodeType="withEffect">
+                                  <p:stCondLst>
+                                    <p:cond delay="0"/>
+                                  </p:stCondLst>
+                                  <p:childTnLst>
+                                    <p:set>
+                                      <p:cBhvr>
+                                        <p:cTn id="24" dur="1" fill="hold">
+                                          <p:stCondLst>
+                                            <p:cond delay="0"/>
+                                          </p:stCondLst>
+                                        </p:cTn>
+                                        <p:tgtEl>
+                                          <p:spTgt spid="3">
+                                            <p:txEl>
+                                              <p:pRg st="4" end="4"/>
+                                            </p:txEl>
+                                          </p:spTgt>
+                                        </p:tgtEl>
+                                        <p:attrNameLst>
+                                          <p:attrName>style.visibility</p:attrName>
+                                        </p:attrNameLst>
+                                      </p:cBhvr>
+                                      <p:to>
+                                        <p:strVal val="visible"/>
+                                      </p:to>
+                                    </p:set>
+                                    <p:anim calcmode="lin" valueType="num">
+                                      <p:cBhvr additive="base">
+                                        <p:cTn id="25" dur="500" fill="hold"/>
+                                        <p:tgtEl>
+                                          <p:spTgt spid="3">
+                                            <p:txEl>
+                                              <p:pRg st="4" end="4"/>
+                                            </p:txEl>
+                                          </p:spTgt>
+                                        </p:tgtEl>
+                                        <p:attrNameLst>
+                                          <p:attrName>ppt_x</p:attrName>
+                                        </p:attrNameLst>
+                                      </p:cBhvr>
+                                      <p:tavLst>
+                                        <p:tav tm="0">
+                                          <p:val>
+                                            <p:strVal val="#ppt_x"/>
+                                          </p:val>
+                                        </p:tav>
+                                        <p:tav tm="100000">
+                                          <p:val>
+                                            <p:strVal val="#ppt_x"/>
+                                          </p:val>
+                                        </p:tav>
+                                      </p:tavLst>
+                                    </p:anim>
+                                    <p:anim calcmode="lin" valueType="num">
+                                      <p:cBhvr additive="base">
+                                        <p:cTn id="26" dur="500" fill="hold"/>
+                                        <p:tgtEl>
+                                          <p:spTgt spid="3">
+                                            <p:txEl>
+                                              <p:pRg st="4" end="4"/>
+                                            </p:txEl>
+                                          </p:spTgt>
+                                        </p:tgtEl>
+                                        <p:attrNameLst>
+                                          <p:attrName>ppt_y</p:attrName>
+                                        </p:attrNameLst>
+                                      </p:cBhvr>
+                                      <p:tavLst>
+                                        <p:tav tm="0">
+                                          <p:val>
+                                            <p:strVal val="1+#ppt_h/2"/>
+                                          </p:val>
+                                        </p:tav>
+                                        <p:tav tm="100000">
+                                          <p:val>
+                                            <p:strVal val="#ppt_y"/>
+                                          </p:val>
+                                        </p:tav>
+                                      </p:tavLst>
+                                    </p:anim>
+                                  </p:childTnLst>
+                                </p:cTn>
+                              </p:par>
+                              <p:par>
+                                <p:cTn id="27" presetID="2" presetClass="entr" presetSubtype="4" fill="hold" grpId="0" nodeType="withEffect">
+                                  <p:stCondLst>
+                                    <p:cond delay="0"/>
+                                  </p:stCondLst>
+                                  <p:childTnLst>
+                                    <p:set>
+                                      <p:cBhvr>
+                                        <p:cTn id="28" dur="1" fill="hold">
+                                          <p:stCondLst>
+                                            <p:cond delay="0"/>
+                                          </p:stCondLst>
+                                        </p:cTn>
+                                        <p:tgtEl>
+                                          <p:spTgt spid="3">
+                                            <p:txEl>
+                                              <p:pRg st="5" end="5"/>
+                                            </p:txEl>
+                                          </p:spTgt>
+                                        </p:tgtEl>
+                                        <p:attrNameLst>
+                                          <p:attrName>style.visibility</p:attrName>
+                                        </p:attrNameLst>
+                                      </p:cBhvr>
+                                      <p:to>
+                                        <p:strVal val="visible"/>
+                                      </p:to>
+                                    </p:set>
+                                    <p:anim calcmode="lin" valueType="num">
+                                      <p:cBhvr additive="base">
+                                        <p:cTn id="29" dur="500" fill="hold"/>
+                                        <p:tgtEl>
+                                          <p:spTgt spid="3">
+                                            <p:txEl>
+                                              <p:pRg st="5" end="5"/>
+                                            </p:txEl>
+                                          </p:spTgt>
+                                        </p:tgtEl>
+                                        <p:attrNameLst>
+                                          <p:attrName>ppt_x</p:attrName>
+                                        </p:attrNameLst>
+                                      </p:cBhvr>
+                                      <p:tavLst>
+                                        <p:tav tm="0">
+                                          <p:val>
+                                            <p:strVal val="#ppt_x"/>
+                                          </p:val>
+                                        </p:tav>
+                                        <p:tav tm="100000">
+                                          <p:val>
+                                            <p:strVal val="#ppt_x"/>
+                                          </p:val>
+                                        </p:tav>
+                                      </p:tavLst>
+                                    </p:anim>
+                                    <p:anim calcmode="lin" valueType="num">
+                                      <p:cBhvr additive="base">
+                                        <p:cTn id="30" dur="500" fill="hold"/>
+                                        <p:tgtEl>
+                                          <p:spTgt spid="3">
+                                            <p:txEl>
+                                              <p:pRg st="5" end="5"/>
+                                            </p:txEl>
+                                          </p:spTgt>
+                                        </p:tgtEl>
+                                        <p:attrNameLst>
+                                          <p:attrName>ppt_y</p:attrName>
+                                        </p:attrNameLst>
+                                      </p:cBhvr>
+                                      <p:tavLst>
+                                        <p:tav tm="0">
+                                          <p:val>
+                                            <p:strVal val="1+#ppt_h/2"/>
+                                          </p:val>
+                                        </p:tav>
+                                        <p:tav tm="100000">
+                                          <p:val>
+                                            <p:strVal val="#ppt_y"/>
+                                          </p:val>
+                                        </p:tav>
+                                      </p:tavLst>
+                                    </p:anim>
+                                  </p:childTnLst>
+                                </p:cTn>
+                              </p:par>
+                            </p:childTnLst>
+                          </p:cTn>
+                        </p:par>
+                      </p:childTnLst>
+                    </p:cTn>
+                  </p:par>
+                  <p:par>
+                    <p:cTn id="31" fill="hold">
+                      <p:stCondLst>
+                        <p:cond delay="indefinite"/>
+                      </p:stCondLst>
+                      <p:childTnLst>
+                        <p:par>
+                          <p:cTn id="32" fill="hold">
+                            <p:stCondLst>
+                              <p:cond delay="0"/>
+                            </p:stCondLst>
+                            <p:childTnLst>
+                              <p:par>
+                                <p:cTn id="33" presetID="2" presetClass="entr" presetSubtype="4" fill="hold" grpId="0" nodeType="clickEffect">
+                                  <p:stCondLst>
+                                    <p:cond delay="0"/>
+                                  </p:stCondLst>
+                                  <p:childTnLst>
+                                    <p:set>
+                                      <p:cBhvr>
+                                        <p:cTn id="34" dur="1" fill="hold">
+                                          <p:stCondLst>
+                                            <p:cond delay="0"/>
+                                          </p:stCondLst>
+                                        </p:cTn>
+                                        <p:tgtEl>
+                                          <p:spTgt spid="3">
+                                            <p:txEl>
+                                              <p:pRg st="7" end="7"/>
+                                            </p:txEl>
+                                          </p:spTgt>
+                                        </p:tgtEl>
+                                        <p:attrNameLst>
+                                          <p:attrName>style.visibility</p:attrName>
+                                        </p:attrNameLst>
+                                      </p:cBhvr>
+                                      <p:to>
+                                        <p:strVal val="visible"/>
+                                      </p:to>
+                                    </p:set>
+                                    <p:anim calcmode="lin" valueType="num">
+                                      <p:cBhvr additive="base">
+                                        <p:cTn id="35" dur="500" fill="hold"/>
+                                        <p:tgtEl>
+                                          <p:spTgt spid="3">
+                                            <p:txEl>
+                                              <p:pRg st="7" end="7"/>
+                                            </p:txEl>
+                                          </p:spTgt>
+                                        </p:tgtEl>
+                                        <p:attrNameLst>
+                                          <p:attrName>ppt_x</p:attrName>
+                                        </p:attrNameLst>
+                                      </p:cBhvr>
+                                      <p:tavLst>
+                                        <p:tav tm="0">
+                                          <p:val>
+                                            <p:strVal val="#ppt_x"/>
+                                          </p:val>
+                                        </p:tav>
+                                        <p:tav tm="100000">
+                                          <p:val>
+                                            <p:strVal val="#ppt_x"/>
+                                          </p:val>
+                                        </p:tav>
+                                      </p:tavLst>
+                                    </p:anim>
+                                    <p:anim calcmode="lin" valueType="num">
+                                      <p:cBhvr additive="base">
+                                        <p:cTn id="36" dur="500" fill="hold"/>
+                                        <p:tgtEl>
+                                          <p:spTgt spid="3">
+                                            <p:txEl>
+                                              <p:pRg st="7" end="7"/>
                                             </p:txEl>
                                           </p:spTgt>
                                         </p:tgtEl>

</xml_diff>